<commit_message>
Add report and stuff
</commit_message>
<xml_diff>
--- a/assets/diagrams.pptx
+++ b/assets/diagrams.pptx
@@ -6,7 +6,9 @@
   </p:sldMasterIdLst>
   <p:sldIdLst>
     <p:sldId id="256" r:id="rId2"/>
-    <p:sldId id="257" r:id="rId3"/>
+    <p:sldId id="259" r:id="rId3"/>
+    <p:sldId id="257" r:id="rId4"/>
+    <p:sldId id="258" r:id="rId5"/>
   </p:sldIdLst>
   <p:sldSz cx="12192000" cy="6858000"/>
   <p:notesSz cx="6858000" cy="9144000"/>
@@ -105,6 +107,11 @@
       </a:defRPr>
     </a:lvl9pPr>
   </p:defaultTextStyle>
+  <p:extLst>
+    <p:ext uri="{EFAFB233-063F-42B5-8137-9DF3F51BA10A}">
+      <p15:sldGuideLst xmlns:p15="http://schemas.microsoft.com/office/powerpoint/2012/main"/>
+    </p:ext>
+  </p:extLst>
 </p:presentation>
 </file>
 
@@ -257,7 +264,7 @@
           <a:p>
             <a:fld id="{5694D60C-8C85-D948-AB3E-B440C37A7BE6}" type="datetimeFigureOut">
               <a:rPr lang="en-US" smtClean="0"/>
-              <a:t>12/9/19</a:t>
+              <a:t>12/10/19</a:t>
             </a:fld>
             <a:endParaRPr lang="en-US"/>
           </a:p>
@@ -457,7 +464,7 @@
           <a:p>
             <a:fld id="{5694D60C-8C85-D948-AB3E-B440C37A7BE6}" type="datetimeFigureOut">
               <a:rPr lang="en-US" smtClean="0"/>
-              <a:t>12/9/19</a:t>
+              <a:t>12/10/19</a:t>
             </a:fld>
             <a:endParaRPr lang="en-US"/>
           </a:p>
@@ -667,7 +674,7 @@
           <a:p>
             <a:fld id="{5694D60C-8C85-D948-AB3E-B440C37A7BE6}" type="datetimeFigureOut">
               <a:rPr lang="en-US" smtClean="0"/>
-              <a:t>12/9/19</a:t>
+              <a:t>12/10/19</a:t>
             </a:fld>
             <a:endParaRPr lang="en-US"/>
           </a:p>
@@ -867,7 +874,7 @@
           <a:p>
             <a:fld id="{5694D60C-8C85-D948-AB3E-B440C37A7BE6}" type="datetimeFigureOut">
               <a:rPr lang="en-US" smtClean="0"/>
-              <a:t>12/9/19</a:t>
+              <a:t>12/10/19</a:t>
             </a:fld>
             <a:endParaRPr lang="en-US"/>
           </a:p>
@@ -1143,7 +1150,7 @@
           <a:p>
             <a:fld id="{5694D60C-8C85-D948-AB3E-B440C37A7BE6}" type="datetimeFigureOut">
               <a:rPr lang="en-US" smtClean="0"/>
-              <a:t>12/9/19</a:t>
+              <a:t>12/10/19</a:t>
             </a:fld>
             <a:endParaRPr lang="en-US"/>
           </a:p>
@@ -1411,7 +1418,7 @@
           <a:p>
             <a:fld id="{5694D60C-8C85-D948-AB3E-B440C37A7BE6}" type="datetimeFigureOut">
               <a:rPr lang="en-US" smtClean="0"/>
-              <a:t>12/9/19</a:t>
+              <a:t>12/10/19</a:t>
             </a:fld>
             <a:endParaRPr lang="en-US"/>
           </a:p>
@@ -1826,7 +1833,7 @@
           <a:p>
             <a:fld id="{5694D60C-8C85-D948-AB3E-B440C37A7BE6}" type="datetimeFigureOut">
               <a:rPr lang="en-US" smtClean="0"/>
-              <a:t>12/9/19</a:t>
+              <a:t>12/10/19</a:t>
             </a:fld>
             <a:endParaRPr lang="en-US"/>
           </a:p>
@@ -1968,7 +1975,7 @@
           <a:p>
             <a:fld id="{5694D60C-8C85-D948-AB3E-B440C37A7BE6}" type="datetimeFigureOut">
               <a:rPr lang="en-US" smtClean="0"/>
-              <a:t>12/9/19</a:t>
+              <a:t>12/10/19</a:t>
             </a:fld>
             <a:endParaRPr lang="en-US"/>
           </a:p>
@@ -2081,7 +2088,7 @@
           <a:p>
             <a:fld id="{5694D60C-8C85-D948-AB3E-B440C37A7BE6}" type="datetimeFigureOut">
               <a:rPr lang="en-US" smtClean="0"/>
-              <a:t>12/9/19</a:t>
+              <a:t>12/10/19</a:t>
             </a:fld>
             <a:endParaRPr lang="en-US"/>
           </a:p>
@@ -2394,7 +2401,7 @@
           <a:p>
             <a:fld id="{5694D60C-8C85-D948-AB3E-B440C37A7BE6}" type="datetimeFigureOut">
               <a:rPr lang="en-US" smtClean="0"/>
-              <a:t>12/9/19</a:t>
+              <a:t>12/10/19</a:t>
             </a:fld>
             <a:endParaRPr lang="en-US"/>
           </a:p>
@@ -2683,7 +2690,7 @@
           <a:p>
             <a:fld id="{5694D60C-8C85-D948-AB3E-B440C37A7BE6}" type="datetimeFigureOut">
               <a:rPr lang="en-US" smtClean="0"/>
-              <a:t>12/9/19</a:t>
+              <a:t>12/10/19</a:t>
             </a:fld>
             <a:endParaRPr lang="en-US"/>
           </a:p>
@@ -2926,7 +2933,7 @@
           <a:p>
             <a:fld id="{5694D60C-8C85-D948-AB3E-B440C37A7BE6}" type="datetimeFigureOut">
               <a:rPr lang="en-US" smtClean="0"/>
-              <a:t>12/9/19</a:t>
+              <a:t>12/10/19</a:t>
             </a:fld>
             <a:endParaRPr lang="en-US"/>
           </a:p>
@@ -4088,6 +4095,734 @@
         </p:nvSpPr>
         <p:spPr>
           <a:xfrm>
+            <a:off x="2707341" y="2554942"/>
+            <a:ext cx="654423" cy="654423"/>
+          </a:xfrm>
+          <a:prstGeom prst="ellipse">
+            <a:avLst/>
+          </a:prstGeom>
+        </p:spPr>
+        <p:style>
+          <a:lnRef idx="2">
+            <a:schemeClr val="dk1"/>
+          </a:lnRef>
+          <a:fillRef idx="1">
+            <a:schemeClr val="lt1"/>
+          </a:fillRef>
+          <a:effectRef idx="0">
+            <a:schemeClr val="dk1"/>
+          </a:effectRef>
+          <a:fontRef idx="minor">
+            <a:schemeClr val="dk1"/>
+          </a:fontRef>
+        </p:style>
+        <p:txBody>
+          <a:bodyPr rtlCol="0" anchor="ctr"/>
+          <a:lstStyle/>
+          <a:p>
+            <a:pPr algn="ctr"/>
+            <a:r>
+              <a:rPr lang="ja-JP" altLang="en-US" sz="1200" b="1">
+                <a:latin typeface="Times" pitchFamily="2" charset="0"/>
+                <a:cs typeface="Arial" panose="020B0604020202020204" pitchFamily="34" charset="0"/>
+              </a:rPr>
+              <a:t>浙</a:t>
+            </a:r>
+            <a:endParaRPr lang="en-US" sz="1200" b="1" baseline="-25000" dirty="0">
+              <a:latin typeface="Times" pitchFamily="2" charset="0"/>
+              <a:cs typeface="Arial" panose="020B0604020202020204" pitchFamily="34" charset="0"/>
+            </a:endParaRPr>
+          </a:p>
+        </p:txBody>
+      </p:sp>
+      <p:sp>
+        <p:nvSpPr>
+          <p:cNvPr id="5" name="Oval 4">
+            <a:extLst>
+              <a:ext uri="{FF2B5EF4-FFF2-40B4-BE49-F238E27FC236}">
+                <a16:creationId xmlns:a16="http://schemas.microsoft.com/office/drawing/2014/main" id="{D38B08E2-6053-E84C-B222-B5CBAE461CFB}"/>
+              </a:ext>
+            </a:extLst>
+          </p:cNvPr>
+          <p:cNvSpPr/>
+          <p:nvPr/>
+        </p:nvSpPr>
+        <p:spPr>
+          <a:xfrm>
+            <a:off x="3827930" y="2554942"/>
+            <a:ext cx="654423" cy="654423"/>
+          </a:xfrm>
+          <a:prstGeom prst="ellipse">
+            <a:avLst/>
+          </a:prstGeom>
+        </p:spPr>
+        <p:style>
+          <a:lnRef idx="2">
+            <a:schemeClr val="dk1"/>
+          </a:lnRef>
+          <a:fillRef idx="1">
+            <a:schemeClr val="lt1"/>
+          </a:fillRef>
+          <a:effectRef idx="0">
+            <a:schemeClr val="dk1"/>
+          </a:effectRef>
+          <a:fontRef idx="minor">
+            <a:schemeClr val="dk1"/>
+          </a:fontRef>
+        </p:style>
+        <p:txBody>
+          <a:bodyPr rtlCol="0" anchor="ctr"/>
+          <a:lstStyle/>
+          <a:p>
+            <a:pPr algn="ctr"/>
+            <a:r>
+              <a:rPr lang="ja-JP" altLang="en-US" sz="1200" b="1">
+                <a:latin typeface="Times" pitchFamily="2" charset="0"/>
+                <a:cs typeface="Arial" panose="020B0604020202020204" pitchFamily="34" charset="0"/>
+              </a:rPr>
+              <a:t>江</a:t>
+            </a:r>
+            <a:endParaRPr lang="en-US" sz="1200" b="1" baseline="-25000" dirty="0">
+              <a:latin typeface="Times" pitchFamily="2" charset="0"/>
+              <a:cs typeface="Arial" panose="020B0604020202020204" pitchFamily="34" charset="0"/>
+            </a:endParaRPr>
+          </a:p>
+        </p:txBody>
+      </p:sp>
+      <p:sp>
+        <p:nvSpPr>
+          <p:cNvPr id="6" name="Oval 5">
+            <a:extLst>
+              <a:ext uri="{FF2B5EF4-FFF2-40B4-BE49-F238E27FC236}">
+                <a16:creationId xmlns:a16="http://schemas.microsoft.com/office/drawing/2014/main" id="{9F402CFF-733F-8549-85E6-72AB8ABA5F9E}"/>
+              </a:ext>
+            </a:extLst>
+          </p:cNvPr>
+          <p:cNvSpPr/>
+          <p:nvPr/>
+        </p:nvSpPr>
+        <p:spPr>
+          <a:xfrm>
+            <a:off x="4948519" y="2554941"/>
+            <a:ext cx="654423" cy="654423"/>
+          </a:xfrm>
+          <a:prstGeom prst="ellipse">
+            <a:avLst/>
+          </a:prstGeom>
+        </p:spPr>
+        <p:style>
+          <a:lnRef idx="2">
+            <a:schemeClr val="dk1"/>
+          </a:lnRef>
+          <a:fillRef idx="1">
+            <a:schemeClr val="lt1"/>
+          </a:fillRef>
+          <a:effectRef idx="0">
+            <a:schemeClr val="dk1"/>
+          </a:effectRef>
+          <a:fontRef idx="minor">
+            <a:schemeClr val="dk1"/>
+          </a:fontRef>
+        </p:style>
+        <p:txBody>
+          <a:bodyPr rtlCol="0" anchor="ctr"/>
+          <a:lstStyle/>
+          <a:p>
+            <a:pPr algn="ctr"/>
+            <a:r>
+              <a:rPr lang="ja-JP" altLang="en-US" sz="1200" b="1">
+                <a:latin typeface="Times" pitchFamily="2" charset="0"/>
+                <a:cs typeface="Arial" panose="020B0604020202020204" pitchFamily="34" charset="0"/>
+              </a:rPr>
+              <a:t>省</a:t>
+            </a:r>
+            <a:endParaRPr lang="en-US" sz="1200" b="1" baseline="-25000" dirty="0">
+              <a:latin typeface="Times" pitchFamily="2" charset="0"/>
+              <a:cs typeface="Arial" panose="020B0604020202020204" pitchFamily="34" charset="0"/>
+            </a:endParaRPr>
+          </a:p>
+        </p:txBody>
+      </p:sp>
+      <p:sp>
+        <p:nvSpPr>
+          <p:cNvPr id="12" name="Oval 11">
+            <a:extLst>
+              <a:ext uri="{FF2B5EF4-FFF2-40B4-BE49-F238E27FC236}">
+                <a16:creationId xmlns:a16="http://schemas.microsoft.com/office/drawing/2014/main" id="{AA052888-B0B5-AA46-9DE6-F60738FF3FCC}"/>
+              </a:ext>
+            </a:extLst>
+          </p:cNvPr>
+          <p:cNvSpPr/>
+          <p:nvPr/>
+        </p:nvSpPr>
+        <p:spPr>
+          <a:xfrm>
+            <a:off x="2707341" y="3617259"/>
+            <a:ext cx="654423" cy="654423"/>
+          </a:xfrm>
+          <a:prstGeom prst="ellipse">
+            <a:avLst/>
+          </a:prstGeom>
+        </p:spPr>
+        <p:style>
+          <a:lnRef idx="2">
+            <a:schemeClr val="dk1"/>
+          </a:lnRef>
+          <a:fillRef idx="1">
+            <a:schemeClr val="lt1"/>
+          </a:fillRef>
+          <a:effectRef idx="0">
+            <a:schemeClr val="dk1"/>
+          </a:effectRef>
+          <a:fontRef idx="minor">
+            <a:schemeClr val="dk1"/>
+          </a:fontRef>
+        </p:style>
+        <p:txBody>
+          <a:bodyPr rtlCol="0" anchor="ctr"/>
+          <a:lstStyle/>
+          <a:p>
+            <a:pPr algn="ctr"/>
+            <a:r>
+              <a:rPr lang="en-US" sz="600" b="1" dirty="0">
+                <a:latin typeface="Times" pitchFamily="2" charset="0"/>
+                <a:cs typeface="Arial" panose="020B0604020202020204" pitchFamily="34" charset="0"/>
+              </a:rPr>
+              <a:t>B - </a:t>
+            </a:r>
+          </a:p>
+          <a:p>
+            <a:pPr algn="ctr"/>
+            <a:r>
+              <a:rPr lang="en-US" sz="600" b="1" dirty="0">
+                <a:latin typeface="Times" pitchFamily="2" charset="0"/>
+                <a:cs typeface="Arial" panose="020B0604020202020204" pitchFamily="34" charset="0"/>
+              </a:rPr>
+              <a:t>PROV</a:t>
+            </a:r>
+          </a:p>
+        </p:txBody>
+      </p:sp>
+      <p:sp>
+        <p:nvSpPr>
+          <p:cNvPr id="13" name="Oval 12">
+            <a:extLst>
+              <a:ext uri="{FF2B5EF4-FFF2-40B4-BE49-F238E27FC236}">
+                <a16:creationId xmlns:a16="http://schemas.microsoft.com/office/drawing/2014/main" id="{AA195A4C-D6C7-064F-917D-9E7799B379C4}"/>
+              </a:ext>
+            </a:extLst>
+          </p:cNvPr>
+          <p:cNvSpPr/>
+          <p:nvPr/>
+        </p:nvSpPr>
+        <p:spPr>
+          <a:xfrm>
+            <a:off x="3827930" y="3617259"/>
+            <a:ext cx="654423" cy="654423"/>
+          </a:xfrm>
+          <a:prstGeom prst="ellipse">
+            <a:avLst/>
+          </a:prstGeom>
+        </p:spPr>
+        <p:style>
+          <a:lnRef idx="2">
+            <a:schemeClr val="dk1"/>
+          </a:lnRef>
+          <a:fillRef idx="1">
+            <a:schemeClr val="lt1"/>
+          </a:fillRef>
+          <a:effectRef idx="0">
+            <a:schemeClr val="dk1"/>
+          </a:effectRef>
+          <a:fontRef idx="minor">
+            <a:schemeClr val="dk1"/>
+          </a:fontRef>
+        </p:style>
+        <p:txBody>
+          <a:bodyPr rtlCol="0" anchor="ctr"/>
+          <a:lstStyle/>
+          <a:p>
+            <a:pPr algn="ctr"/>
+            <a:r>
+              <a:rPr lang="en-US" sz="600" b="1" dirty="0">
+                <a:latin typeface="Times" pitchFamily="2" charset="0"/>
+                <a:cs typeface="Arial" panose="020B0604020202020204" pitchFamily="34" charset="0"/>
+              </a:rPr>
+              <a:t>I - </a:t>
+            </a:r>
+          </a:p>
+          <a:p>
+            <a:pPr algn="ctr"/>
+            <a:r>
+              <a:rPr lang="en-US" sz="600" b="1" dirty="0">
+                <a:latin typeface="Times" pitchFamily="2" charset="0"/>
+                <a:cs typeface="Arial" panose="020B0604020202020204" pitchFamily="34" charset="0"/>
+              </a:rPr>
+              <a:t>PROV</a:t>
+            </a:r>
+            <a:endParaRPr lang="en-US" sz="600" b="1" baseline="-25000" dirty="0">
+              <a:latin typeface="Times" pitchFamily="2" charset="0"/>
+              <a:cs typeface="Arial" panose="020B0604020202020204" pitchFamily="34" charset="0"/>
+            </a:endParaRPr>
+          </a:p>
+        </p:txBody>
+      </p:sp>
+      <p:sp>
+        <p:nvSpPr>
+          <p:cNvPr id="14" name="Oval 13">
+            <a:extLst>
+              <a:ext uri="{FF2B5EF4-FFF2-40B4-BE49-F238E27FC236}">
+                <a16:creationId xmlns:a16="http://schemas.microsoft.com/office/drawing/2014/main" id="{E2373D1B-801C-9547-AF15-F561E20D62E5}"/>
+              </a:ext>
+            </a:extLst>
+          </p:cNvPr>
+          <p:cNvSpPr/>
+          <p:nvPr/>
+        </p:nvSpPr>
+        <p:spPr>
+          <a:xfrm>
+            <a:off x="4948519" y="3617258"/>
+            <a:ext cx="654423" cy="654423"/>
+          </a:xfrm>
+          <a:prstGeom prst="ellipse">
+            <a:avLst/>
+          </a:prstGeom>
+        </p:spPr>
+        <p:style>
+          <a:lnRef idx="2">
+            <a:schemeClr val="dk1"/>
+          </a:lnRef>
+          <a:fillRef idx="1">
+            <a:schemeClr val="lt1"/>
+          </a:fillRef>
+          <a:effectRef idx="0">
+            <a:schemeClr val="dk1"/>
+          </a:effectRef>
+          <a:fontRef idx="minor">
+            <a:schemeClr val="dk1"/>
+          </a:fontRef>
+        </p:style>
+        <p:txBody>
+          <a:bodyPr rtlCol="0" anchor="ctr"/>
+          <a:lstStyle/>
+          <a:p>
+            <a:pPr algn="ctr"/>
+            <a:r>
+              <a:rPr lang="en-US" sz="600" b="1" dirty="0">
+                <a:latin typeface="Times" pitchFamily="2" charset="0"/>
+                <a:cs typeface="Arial" panose="020B0604020202020204" pitchFamily="34" charset="0"/>
+              </a:rPr>
+              <a:t>I - </a:t>
+            </a:r>
+          </a:p>
+          <a:p>
+            <a:pPr algn="ctr"/>
+            <a:r>
+              <a:rPr lang="en-US" sz="600" b="1" dirty="0">
+                <a:latin typeface="Times" pitchFamily="2" charset="0"/>
+                <a:cs typeface="Arial" panose="020B0604020202020204" pitchFamily="34" charset="0"/>
+              </a:rPr>
+              <a:t>PROV</a:t>
+            </a:r>
+            <a:endParaRPr lang="en-US" sz="600" b="1" baseline="-25000" dirty="0">
+              <a:latin typeface="Times" pitchFamily="2" charset="0"/>
+              <a:cs typeface="Arial" panose="020B0604020202020204" pitchFamily="34" charset="0"/>
+            </a:endParaRPr>
+          </a:p>
+        </p:txBody>
+      </p:sp>
+      <p:cxnSp>
+        <p:nvCxnSpPr>
+          <p:cNvPr id="17" name="Straight Arrow Connector 16">
+            <a:extLst>
+              <a:ext uri="{FF2B5EF4-FFF2-40B4-BE49-F238E27FC236}">
+                <a16:creationId xmlns:a16="http://schemas.microsoft.com/office/drawing/2014/main" id="{D2ACD8EB-8665-1B48-B21B-D23093D52BCF}"/>
+              </a:ext>
+            </a:extLst>
+          </p:cNvPr>
+          <p:cNvCxnSpPr>
+            <a:stCxn id="4" idx="6"/>
+            <a:endCxn id="5" idx="2"/>
+          </p:cNvCxnSpPr>
+          <p:nvPr/>
+        </p:nvCxnSpPr>
+        <p:spPr>
+          <a:xfrm>
+            <a:off x="3361764" y="2882154"/>
+            <a:ext cx="466166" cy="0"/>
+          </a:xfrm>
+          <a:prstGeom prst="straightConnector1">
+            <a:avLst/>
+          </a:prstGeom>
+          <a:ln>
+            <a:tailEnd type="triangle"/>
+          </a:ln>
+        </p:spPr>
+        <p:style>
+          <a:lnRef idx="1">
+            <a:schemeClr val="dk1"/>
+          </a:lnRef>
+          <a:fillRef idx="0">
+            <a:schemeClr val="dk1"/>
+          </a:fillRef>
+          <a:effectRef idx="0">
+            <a:schemeClr val="dk1"/>
+          </a:effectRef>
+          <a:fontRef idx="minor">
+            <a:schemeClr val="tx1"/>
+          </a:fontRef>
+        </p:style>
+      </p:cxnSp>
+      <p:cxnSp>
+        <p:nvCxnSpPr>
+          <p:cNvPr id="19" name="Straight Arrow Connector 18">
+            <a:extLst>
+              <a:ext uri="{FF2B5EF4-FFF2-40B4-BE49-F238E27FC236}">
+                <a16:creationId xmlns:a16="http://schemas.microsoft.com/office/drawing/2014/main" id="{083C618E-9A7A-7942-BB39-38824BCDAB88}"/>
+              </a:ext>
+            </a:extLst>
+          </p:cNvPr>
+          <p:cNvCxnSpPr>
+            <a:stCxn id="5" idx="6"/>
+            <a:endCxn id="6" idx="2"/>
+          </p:cNvCxnSpPr>
+          <p:nvPr/>
+        </p:nvCxnSpPr>
+        <p:spPr>
+          <a:xfrm flipV="1">
+            <a:off x="4482353" y="2882153"/>
+            <a:ext cx="466166" cy="1"/>
+          </a:xfrm>
+          <a:prstGeom prst="straightConnector1">
+            <a:avLst/>
+          </a:prstGeom>
+          <a:ln>
+            <a:tailEnd type="triangle"/>
+          </a:ln>
+        </p:spPr>
+        <p:style>
+          <a:lnRef idx="1">
+            <a:schemeClr val="dk1"/>
+          </a:lnRef>
+          <a:fillRef idx="0">
+            <a:schemeClr val="dk1"/>
+          </a:fillRef>
+          <a:effectRef idx="0">
+            <a:schemeClr val="dk1"/>
+          </a:effectRef>
+          <a:fontRef idx="minor">
+            <a:schemeClr val="tx1"/>
+          </a:fontRef>
+        </p:style>
+      </p:cxnSp>
+      <p:cxnSp>
+        <p:nvCxnSpPr>
+          <p:cNvPr id="21" name="Straight Arrow Connector 20">
+            <a:extLst>
+              <a:ext uri="{FF2B5EF4-FFF2-40B4-BE49-F238E27FC236}">
+                <a16:creationId xmlns:a16="http://schemas.microsoft.com/office/drawing/2014/main" id="{9503D39B-6CA0-0248-B633-84CA6686FDD4}"/>
+              </a:ext>
+            </a:extLst>
+          </p:cNvPr>
+          <p:cNvCxnSpPr>
+            <a:cxnSpLocks/>
+            <a:stCxn id="6" idx="6"/>
+          </p:cNvCxnSpPr>
+          <p:nvPr/>
+        </p:nvCxnSpPr>
+        <p:spPr>
+          <a:xfrm>
+            <a:off x="5602942" y="2882153"/>
+            <a:ext cx="466166" cy="0"/>
+          </a:xfrm>
+          <a:prstGeom prst="straightConnector1">
+            <a:avLst/>
+          </a:prstGeom>
+          <a:ln>
+            <a:tailEnd type="triangle"/>
+          </a:ln>
+        </p:spPr>
+        <p:style>
+          <a:lnRef idx="1">
+            <a:schemeClr val="dk1"/>
+          </a:lnRef>
+          <a:fillRef idx="0">
+            <a:schemeClr val="dk1"/>
+          </a:fillRef>
+          <a:effectRef idx="0">
+            <a:schemeClr val="dk1"/>
+          </a:effectRef>
+          <a:fontRef idx="minor">
+            <a:schemeClr val="tx1"/>
+          </a:fontRef>
+        </p:style>
+      </p:cxnSp>
+      <p:cxnSp>
+        <p:nvCxnSpPr>
+          <p:cNvPr id="24" name="Straight Arrow Connector 23">
+            <a:extLst>
+              <a:ext uri="{FF2B5EF4-FFF2-40B4-BE49-F238E27FC236}">
+                <a16:creationId xmlns:a16="http://schemas.microsoft.com/office/drawing/2014/main" id="{ABCF84FE-2F14-7A49-8411-90BD6F150A45}"/>
+              </a:ext>
+            </a:extLst>
+          </p:cNvPr>
+          <p:cNvCxnSpPr>
+            <a:cxnSpLocks/>
+            <a:stCxn id="4" idx="4"/>
+            <a:endCxn id="12" idx="0"/>
+          </p:cNvCxnSpPr>
+          <p:nvPr/>
+        </p:nvCxnSpPr>
+        <p:spPr>
+          <a:xfrm>
+            <a:off x="3034553" y="3209365"/>
+            <a:ext cx="0" cy="407894"/>
+          </a:xfrm>
+          <a:prstGeom prst="straightConnector1">
+            <a:avLst/>
+          </a:prstGeom>
+          <a:ln>
+            <a:tailEnd type="triangle"/>
+          </a:ln>
+        </p:spPr>
+        <p:style>
+          <a:lnRef idx="1">
+            <a:schemeClr val="dk1"/>
+          </a:lnRef>
+          <a:fillRef idx="0">
+            <a:schemeClr val="dk1"/>
+          </a:fillRef>
+          <a:effectRef idx="0">
+            <a:schemeClr val="dk1"/>
+          </a:effectRef>
+          <a:fontRef idx="minor">
+            <a:schemeClr val="tx1"/>
+          </a:fontRef>
+        </p:style>
+      </p:cxnSp>
+      <p:sp>
+        <p:nvSpPr>
+          <p:cNvPr id="27" name="Oval 26">
+            <a:extLst>
+              <a:ext uri="{FF2B5EF4-FFF2-40B4-BE49-F238E27FC236}">
+                <a16:creationId xmlns:a16="http://schemas.microsoft.com/office/drawing/2014/main" id="{647EC8FB-03A9-7741-9815-51A9BC1902E0}"/>
+              </a:ext>
+            </a:extLst>
+          </p:cNvPr>
+          <p:cNvSpPr/>
+          <p:nvPr/>
+        </p:nvSpPr>
+        <p:spPr>
+          <a:xfrm>
+            <a:off x="1586752" y="2554941"/>
+            <a:ext cx="654423" cy="654423"/>
+          </a:xfrm>
+          <a:prstGeom prst="ellipse">
+            <a:avLst/>
+          </a:prstGeom>
+        </p:spPr>
+        <p:style>
+          <a:lnRef idx="2">
+            <a:schemeClr val="dk1"/>
+          </a:lnRef>
+          <a:fillRef idx="1">
+            <a:schemeClr val="lt1"/>
+          </a:fillRef>
+          <a:effectRef idx="0">
+            <a:schemeClr val="dk1"/>
+          </a:effectRef>
+          <a:fontRef idx="minor">
+            <a:schemeClr val="dk1"/>
+          </a:fontRef>
+        </p:style>
+        <p:txBody>
+          <a:bodyPr rtlCol="0" anchor="ctr"/>
+          <a:lstStyle/>
+          <a:p>
+            <a:pPr algn="ctr"/>
+            <a:r>
+              <a:rPr lang="en-US" sz="600" b="1" dirty="0">
+                <a:latin typeface="Times" pitchFamily="2" charset="0"/>
+                <a:cs typeface="Arial" panose="020B0604020202020204" pitchFamily="34" charset="0"/>
+              </a:rPr>
+              <a:t>START</a:t>
+            </a:r>
+          </a:p>
+        </p:txBody>
+      </p:sp>
+      <p:cxnSp>
+        <p:nvCxnSpPr>
+          <p:cNvPr id="28" name="Straight Arrow Connector 27">
+            <a:extLst>
+              <a:ext uri="{FF2B5EF4-FFF2-40B4-BE49-F238E27FC236}">
+                <a16:creationId xmlns:a16="http://schemas.microsoft.com/office/drawing/2014/main" id="{9B6C41B2-D3CC-D34F-8821-8142DE1E1A20}"/>
+              </a:ext>
+            </a:extLst>
+          </p:cNvPr>
+          <p:cNvCxnSpPr>
+            <a:cxnSpLocks/>
+            <a:stCxn id="27" idx="6"/>
+            <a:endCxn id="4" idx="2"/>
+          </p:cNvCxnSpPr>
+          <p:nvPr/>
+        </p:nvCxnSpPr>
+        <p:spPr>
+          <a:xfrm>
+            <a:off x="2241175" y="2882153"/>
+            <a:ext cx="466166" cy="1"/>
+          </a:xfrm>
+          <a:prstGeom prst="straightConnector1">
+            <a:avLst/>
+          </a:prstGeom>
+          <a:ln>
+            <a:tailEnd type="triangle"/>
+          </a:ln>
+        </p:spPr>
+        <p:style>
+          <a:lnRef idx="1">
+            <a:schemeClr val="dk1"/>
+          </a:lnRef>
+          <a:fillRef idx="0">
+            <a:schemeClr val="dk1"/>
+          </a:fillRef>
+          <a:effectRef idx="0">
+            <a:schemeClr val="dk1"/>
+          </a:effectRef>
+          <a:fontRef idx="minor">
+            <a:schemeClr val="tx1"/>
+          </a:fontRef>
+        </p:style>
+      </p:cxnSp>
+      <p:cxnSp>
+        <p:nvCxnSpPr>
+          <p:cNvPr id="31" name="Straight Arrow Connector 30">
+            <a:extLst>
+              <a:ext uri="{FF2B5EF4-FFF2-40B4-BE49-F238E27FC236}">
+                <a16:creationId xmlns:a16="http://schemas.microsoft.com/office/drawing/2014/main" id="{0F33DE63-8713-8F42-9B16-18D8862ED8E0}"/>
+              </a:ext>
+            </a:extLst>
+          </p:cNvPr>
+          <p:cNvCxnSpPr>
+            <a:cxnSpLocks/>
+            <a:stCxn id="5" idx="4"/>
+            <a:endCxn id="13" idx="0"/>
+          </p:cNvCxnSpPr>
+          <p:nvPr/>
+        </p:nvCxnSpPr>
+        <p:spPr>
+          <a:xfrm>
+            <a:off x="4155142" y="3209365"/>
+            <a:ext cx="0" cy="407894"/>
+          </a:xfrm>
+          <a:prstGeom prst="straightConnector1">
+            <a:avLst/>
+          </a:prstGeom>
+          <a:ln>
+            <a:tailEnd type="triangle"/>
+          </a:ln>
+        </p:spPr>
+        <p:style>
+          <a:lnRef idx="1">
+            <a:schemeClr val="dk1"/>
+          </a:lnRef>
+          <a:fillRef idx="0">
+            <a:schemeClr val="dk1"/>
+          </a:fillRef>
+          <a:effectRef idx="0">
+            <a:schemeClr val="dk1"/>
+          </a:effectRef>
+          <a:fontRef idx="minor">
+            <a:schemeClr val="tx1"/>
+          </a:fontRef>
+        </p:style>
+      </p:cxnSp>
+      <p:cxnSp>
+        <p:nvCxnSpPr>
+          <p:cNvPr id="34" name="Straight Arrow Connector 33">
+            <a:extLst>
+              <a:ext uri="{FF2B5EF4-FFF2-40B4-BE49-F238E27FC236}">
+                <a16:creationId xmlns:a16="http://schemas.microsoft.com/office/drawing/2014/main" id="{FBC744A6-A7D5-2945-A6CA-2A431E3F42B5}"/>
+              </a:ext>
+            </a:extLst>
+          </p:cNvPr>
+          <p:cNvCxnSpPr>
+            <a:cxnSpLocks/>
+            <a:stCxn id="6" idx="4"/>
+            <a:endCxn id="14" idx="0"/>
+          </p:cNvCxnSpPr>
+          <p:nvPr/>
+        </p:nvCxnSpPr>
+        <p:spPr>
+          <a:xfrm>
+            <a:off x="5275731" y="3209364"/>
+            <a:ext cx="0" cy="407894"/>
+          </a:xfrm>
+          <a:prstGeom prst="straightConnector1">
+            <a:avLst/>
+          </a:prstGeom>
+          <a:ln>
+            <a:tailEnd type="triangle"/>
+          </a:ln>
+        </p:spPr>
+        <p:style>
+          <a:lnRef idx="1">
+            <a:schemeClr val="dk1"/>
+          </a:lnRef>
+          <a:fillRef idx="0">
+            <a:schemeClr val="dk1"/>
+          </a:fillRef>
+          <a:effectRef idx="0">
+            <a:schemeClr val="dk1"/>
+          </a:effectRef>
+          <a:fontRef idx="minor">
+            <a:schemeClr val="tx1"/>
+          </a:fontRef>
+        </p:style>
+      </p:cxnSp>
+    </p:spTree>
+    <p:extLst>
+      <p:ext uri="{BB962C8B-B14F-4D97-AF65-F5344CB8AC3E}">
+        <p14:creationId xmlns:p14="http://schemas.microsoft.com/office/powerpoint/2010/main" val="4176819486"/>
+      </p:ext>
+    </p:extLst>
+  </p:cSld>
+  <p:clrMapOvr>
+    <a:masterClrMapping/>
+  </p:clrMapOvr>
+</p:sld>
+</file>
+
+<file path=ppt/slides/slide3.xml><?xml version="1.0" encoding="utf-8"?>
+<p:sld xmlns:a="http://schemas.openxmlformats.org/drawingml/2006/main" xmlns:r="http://schemas.openxmlformats.org/officeDocument/2006/relationships" xmlns:p="http://schemas.openxmlformats.org/presentationml/2006/main">
+  <p:cSld>
+    <p:spTree>
+      <p:nvGrpSpPr>
+        <p:cNvPr id="1" name=""/>
+        <p:cNvGrpSpPr/>
+        <p:nvPr/>
+      </p:nvGrpSpPr>
+      <p:grpSpPr>
+        <a:xfrm>
+          <a:off x="0" y="0"/>
+          <a:ext cx="0" cy="0"/>
+          <a:chOff x="0" y="0"/>
+          <a:chExt cx="0" cy="0"/>
+        </a:xfrm>
+      </p:grpSpPr>
+      <p:sp>
+        <p:nvSpPr>
+          <p:cNvPr id="4" name="Oval 3">
+            <a:extLst>
+              <a:ext uri="{FF2B5EF4-FFF2-40B4-BE49-F238E27FC236}">
+                <a16:creationId xmlns:a16="http://schemas.microsoft.com/office/drawing/2014/main" id="{1E688CFB-3DDC-6947-982B-55FD306D2BA0}"/>
+              </a:ext>
+            </a:extLst>
+          </p:cNvPr>
+          <p:cNvSpPr/>
+          <p:nvPr/>
+        </p:nvSpPr>
+        <p:spPr>
+          <a:xfrm>
             <a:off x="1497106" y="2357719"/>
             <a:ext cx="654423" cy="654423"/>
           </a:xfrm>
@@ -5572,6 +6307,2101 @@
     <p:extLst>
       <p:ext uri="{BB962C8B-B14F-4D97-AF65-F5344CB8AC3E}">
         <p14:creationId xmlns:p14="http://schemas.microsoft.com/office/powerpoint/2010/main" val="3543270046"/>
+      </p:ext>
+    </p:extLst>
+  </p:cSld>
+  <p:clrMapOvr>
+    <a:masterClrMapping/>
+  </p:clrMapOvr>
+</p:sld>
+</file>
+
+<file path=ppt/slides/slide4.xml><?xml version="1.0" encoding="utf-8"?>
+<p:sld xmlns:a="http://schemas.openxmlformats.org/drawingml/2006/main" xmlns:r="http://schemas.openxmlformats.org/officeDocument/2006/relationships" xmlns:p="http://schemas.openxmlformats.org/presentationml/2006/main">
+  <p:cSld>
+    <p:spTree>
+      <p:nvGrpSpPr>
+        <p:cNvPr id="1" name=""/>
+        <p:cNvGrpSpPr/>
+        <p:nvPr/>
+      </p:nvGrpSpPr>
+      <p:grpSpPr>
+        <a:xfrm>
+          <a:off x="0" y="0"/>
+          <a:ext cx="0" cy="0"/>
+          <a:chOff x="0" y="0"/>
+          <a:chExt cx="0" cy="0"/>
+        </a:xfrm>
+      </p:grpSpPr>
+      <p:sp>
+        <p:nvSpPr>
+          <p:cNvPr id="23" name="Oval 22">
+            <a:extLst>
+              <a:ext uri="{FF2B5EF4-FFF2-40B4-BE49-F238E27FC236}">
+                <a16:creationId xmlns:a16="http://schemas.microsoft.com/office/drawing/2014/main" id="{AF7E9083-F8F7-EC47-877E-ED0DB9B6252A}"/>
+              </a:ext>
+            </a:extLst>
+          </p:cNvPr>
+          <p:cNvSpPr/>
+          <p:nvPr/>
+        </p:nvSpPr>
+        <p:spPr>
+          <a:xfrm>
+            <a:off x="4970938" y="2792505"/>
+            <a:ext cx="340660" cy="340660"/>
+          </a:xfrm>
+          <a:prstGeom prst="ellipse">
+            <a:avLst/>
+          </a:prstGeom>
+        </p:spPr>
+        <p:style>
+          <a:lnRef idx="2">
+            <a:schemeClr val="dk1"/>
+          </a:lnRef>
+          <a:fillRef idx="1">
+            <a:schemeClr val="lt1"/>
+          </a:fillRef>
+          <a:effectRef idx="0">
+            <a:schemeClr val="dk1"/>
+          </a:effectRef>
+          <a:fontRef idx="minor">
+            <a:schemeClr val="dk1"/>
+          </a:fontRef>
+        </p:style>
+        <p:txBody>
+          <a:bodyPr rtlCol="0" anchor="ctr"/>
+          <a:lstStyle/>
+          <a:p>
+            <a:pPr algn="ctr"/>
+            <a:endParaRPr lang="en-US" sz="1000" b="1" dirty="0">
+              <a:latin typeface="Times" pitchFamily="2" charset="0"/>
+              <a:cs typeface="Arial" panose="020B0604020202020204" pitchFamily="34" charset="0"/>
+            </a:endParaRPr>
+          </a:p>
+        </p:txBody>
+      </p:sp>
+      <p:sp>
+        <p:nvSpPr>
+          <p:cNvPr id="29" name="Oval 28">
+            <a:extLst>
+              <a:ext uri="{FF2B5EF4-FFF2-40B4-BE49-F238E27FC236}">
+                <a16:creationId xmlns:a16="http://schemas.microsoft.com/office/drawing/2014/main" id="{1318410B-34C6-4544-9D31-9C29E4DB0093}"/>
+              </a:ext>
+            </a:extLst>
+          </p:cNvPr>
+          <p:cNvSpPr/>
+          <p:nvPr/>
+        </p:nvSpPr>
+        <p:spPr>
+          <a:xfrm>
+            <a:off x="3500724" y="1125068"/>
+            <a:ext cx="340660" cy="340660"/>
+          </a:xfrm>
+          <a:prstGeom prst="ellipse">
+            <a:avLst/>
+          </a:prstGeom>
+        </p:spPr>
+        <p:style>
+          <a:lnRef idx="2">
+            <a:schemeClr val="dk1"/>
+          </a:lnRef>
+          <a:fillRef idx="1">
+            <a:schemeClr val="lt1"/>
+          </a:fillRef>
+          <a:effectRef idx="0">
+            <a:schemeClr val="dk1"/>
+          </a:effectRef>
+          <a:fontRef idx="minor">
+            <a:schemeClr val="dk1"/>
+          </a:fontRef>
+        </p:style>
+        <p:txBody>
+          <a:bodyPr rtlCol="0" anchor="ctr"/>
+          <a:lstStyle/>
+          <a:p>
+            <a:pPr algn="ctr"/>
+            <a:endParaRPr lang="en-US" sz="1000" b="1" dirty="0">
+              <a:latin typeface="Times" pitchFamily="2" charset="0"/>
+              <a:cs typeface="Arial" panose="020B0604020202020204" pitchFamily="34" charset="0"/>
+            </a:endParaRPr>
+          </a:p>
+        </p:txBody>
+      </p:sp>
+      <p:sp>
+        <p:nvSpPr>
+          <p:cNvPr id="41" name="Oval 40">
+            <a:extLst>
+              <a:ext uri="{FF2B5EF4-FFF2-40B4-BE49-F238E27FC236}">
+                <a16:creationId xmlns:a16="http://schemas.microsoft.com/office/drawing/2014/main" id="{968DAA29-77D1-C545-BCB1-08835510CF09}"/>
+              </a:ext>
+            </a:extLst>
+          </p:cNvPr>
+          <p:cNvSpPr/>
+          <p:nvPr/>
+        </p:nvSpPr>
+        <p:spPr>
+          <a:xfrm>
+            <a:off x="3500725" y="2792505"/>
+            <a:ext cx="340660" cy="340660"/>
+          </a:xfrm>
+          <a:prstGeom prst="ellipse">
+            <a:avLst/>
+          </a:prstGeom>
+        </p:spPr>
+        <p:style>
+          <a:lnRef idx="2">
+            <a:schemeClr val="dk1"/>
+          </a:lnRef>
+          <a:fillRef idx="1">
+            <a:schemeClr val="lt1"/>
+          </a:fillRef>
+          <a:effectRef idx="0">
+            <a:schemeClr val="dk1"/>
+          </a:effectRef>
+          <a:fontRef idx="minor">
+            <a:schemeClr val="dk1"/>
+          </a:fontRef>
+        </p:style>
+        <p:txBody>
+          <a:bodyPr rtlCol="0" anchor="ctr"/>
+          <a:lstStyle/>
+          <a:p>
+            <a:pPr algn="ctr"/>
+            <a:endParaRPr lang="en-US" sz="1000" b="1" dirty="0">
+              <a:latin typeface="Times" pitchFamily="2" charset="0"/>
+              <a:cs typeface="Arial" panose="020B0604020202020204" pitchFamily="34" charset="0"/>
+            </a:endParaRPr>
+          </a:p>
+        </p:txBody>
+      </p:sp>
+      <p:sp>
+        <p:nvSpPr>
+          <p:cNvPr id="42" name="Oval 41">
+            <a:extLst>
+              <a:ext uri="{FF2B5EF4-FFF2-40B4-BE49-F238E27FC236}">
+                <a16:creationId xmlns:a16="http://schemas.microsoft.com/office/drawing/2014/main" id="{8F3349CA-5427-0749-A49F-9EBF4C8FD8DF}"/>
+              </a:ext>
+            </a:extLst>
+          </p:cNvPr>
+          <p:cNvSpPr/>
+          <p:nvPr/>
+        </p:nvSpPr>
+        <p:spPr>
+          <a:xfrm>
+            <a:off x="3500723" y="1958786"/>
+            <a:ext cx="340660" cy="340660"/>
+          </a:xfrm>
+          <a:prstGeom prst="ellipse">
+            <a:avLst/>
+          </a:prstGeom>
+        </p:spPr>
+        <p:style>
+          <a:lnRef idx="2">
+            <a:schemeClr val="dk1"/>
+          </a:lnRef>
+          <a:fillRef idx="1">
+            <a:schemeClr val="lt1"/>
+          </a:fillRef>
+          <a:effectRef idx="0">
+            <a:schemeClr val="dk1"/>
+          </a:effectRef>
+          <a:fontRef idx="minor">
+            <a:schemeClr val="dk1"/>
+          </a:fontRef>
+        </p:style>
+        <p:txBody>
+          <a:bodyPr rtlCol="0" anchor="ctr"/>
+          <a:lstStyle/>
+          <a:p>
+            <a:pPr algn="ctr"/>
+            <a:endParaRPr lang="en-US" sz="1000" b="1" dirty="0">
+              <a:latin typeface="Times" pitchFamily="2" charset="0"/>
+              <a:cs typeface="Arial" panose="020B0604020202020204" pitchFamily="34" charset="0"/>
+            </a:endParaRPr>
+          </a:p>
+        </p:txBody>
+      </p:sp>
+      <p:sp>
+        <p:nvSpPr>
+          <p:cNvPr id="43" name="Oval 42">
+            <a:extLst>
+              <a:ext uri="{FF2B5EF4-FFF2-40B4-BE49-F238E27FC236}">
+                <a16:creationId xmlns:a16="http://schemas.microsoft.com/office/drawing/2014/main" id="{4FBFEDD6-BC30-6041-9E1A-14CC27449633}"/>
+              </a:ext>
+            </a:extLst>
+          </p:cNvPr>
+          <p:cNvSpPr/>
+          <p:nvPr/>
+        </p:nvSpPr>
+        <p:spPr>
+          <a:xfrm>
+            <a:off x="3500723" y="3626223"/>
+            <a:ext cx="340660" cy="340660"/>
+          </a:xfrm>
+          <a:prstGeom prst="ellipse">
+            <a:avLst/>
+          </a:prstGeom>
+        </p:spPr>
+        <p:style>
+          <a:lnRef idx="2">
+            <a:schemeClr val="dk1"/>
+          </a:lnRef>
+          <a:fillRef idx="1">
+            <a:schemeClr val="lt1"/>
+          </a:fillRef>
+          <a:effectRef idx="0">
+            <a:schemeClr val="dk1"/>
+          </a:effectRef>
+          <a:fontRef idx="minor">
+            <a:schemeClr val="dk1"/>
+          </a:fontRef>
+        </p:style>
+        <p:txBody>
+          <a:bodyPr rtlCol="0" anchor="ctr"/>
+          <a:lstStyle/>
+          <a:p>
+            <a:pPr algn="ctr"/>
+            <a:endParaRPr lang="en-US" sz="1000" b="1" dirty="0">
+              <a:latin typeface="Times" pitchFamily="2" charset="0"/>
+              <a:cs typeface="Arial" panose="020B0604020202020204" pitchFamily="34" charset="0"/>
+            </a:endParaRPr>
+          </a:p>
+        </p:txBody>
+      </p:sp>
+      <p:sp>
+        <p:nvSpPr>
+          <p:cNvPr id="44" name="Oval 43">
+            <a:extLst>
+              <a:ext uri="{FF2B5EF4-FFF2-40B4-BE49-F238E27FC236}">
+                <a16:creationId xmlns:a16="http://schemas.microsoft.com/office/drawing/2014/main" id="{FB90A37D-7F69-6943-BEEF-612DE8947B87}"/>
+              </a:ext>
+            </a:extLst>
+          </p:cNvPr>
+          <p:cNvSpPr/>
+          <p:nvPr/>
+        </p:nvSpPr>
+        <p:spPr>
+          <a:xfrm>
+            <a:off x="3500722" y="4459941"/>
+            <a:ext cx="340660" cy="340660"/>
+          </a:xfrm>
+          <a:prstGeom prst="ellipse">
+            <a:avLst/>
+          </a:prstGeom>
+        </p:spPr>
+        <p:style>
+          <a:lnRef idx="2">
+            <a:schemeClr val="dk1"/>
+          </a:lnRef>
+          <a:fillRef idx="1">
+            <a:schemeClr val="lt1"/>
+          </a:fillRef>
+          <a:effectRef idx="0">
+            <a:schemeClr val="dk1"/>
+          </a:effectRef>
+          <a:fontRef idx="minor">
+            <a:schemeClr val="dk1"/>
+          </a:fontRef>
+        </p:style>
+        <p:txBody>
+          <a:bodyPr rtlCol="0" anchor="ctr"/>
+          <a:lstStyle/>
+          <a:p>
+            <a:pPr algn="ctr"/>
+            <a:endParaRPr lang="en-US" sz="1000" b="1" dirty="0">
+              <a:latin typeface="Times" pitchFamily="2" charset="0"/>
+              <a:cs typeface="Arial" panose="020B0604020202020204" pitchFamily="34" charset="0"/>
+            </a:endParaRPr>
+          </a:p>
+        </p:txBody>
+      </p:sp>
+      <p:cxnSp>
+        <p:nvCxnSpPr>
+          <p:cNvPr id="7" name="Straight Arrow Connector 6">
+            <a:extLst>
+              <a:ext uri="{FF2B5EF4-FFF2-40B4-BE49-F238E27FC236}">
+                <a16:creationId xmlns:a16="http://schemas.microsoft.com/office/drawing/2014/main" id="{6BAD881B-5CF2-7346-BE26-C61F45153A9C}"/>
+              </a:ext>
+            </a:extLst>
+          </p:cNvPr>
+          <p:cNvCxnSpPr>
+            <a:stCxn id="23" idx="2"/>
+            <a:endCxn id="41" idx="6"/>
+          </p:cNvCxnSpPr>
+          <p:nvPr/>
+        </p:nvCxnSpPr>
+        <p:spPr>
+          <a:xfrm flipH="1">
+            <a:off x="3841385" y="2962835"/>
+            <a:ext cx="1129553" cy="0"/>
+          </a:xfrm>
+          <a:prstGeom prst="straightConnector1">
+            <a:avLst/>
+          </a:prstGeom>
+          <a:ln w="28575">
+            <a:headEnd type="none" w="med" len="med"/>
+            <a:tailEnd type="none" w="med" len="med"/>
+          </a:ln>
+        </p:spPr>
+        <p:style>
+          <a:lnRef idx="1">
+            <a:schemeClr val="dk1"/>
+          </a:lnRef>
+          <a:fillRef idx="0">
+            <a:schemeClr val="dk1"/>
+          </a:fillRef>
+          <a:effectRef idx="0">
+            <a:schemeClr val="dk1"/>
+          </a:effectRef>
+          <a:fontRef idx="minor">
+            <a:schemeClr val="tx1"/>
+          </a:fontRef>
+        </p:style>
+      </p:cxnSp>
+      <p:cxnSp>
+        <p:nvCxnSpPr>
+          <p:cNvPr id="45" name="Straight Arrow Connector 44">
+            <a:extLst>
+              <a:ext uri="{FF2B5EF4-FFF2-40B4-BE49-F238E27FC236}">
+                <a16:creationId xmlns:a16="http://schemas.microsoft.com/office/drawing/2014/main" id="{CEE8C247-FCC2-D44B-8B73-7F29474F9112}"/>
+              </a:ext>
+            </a:extLst>
+          </p:cNvPr>
+          <p:cNvCxnSpPr>
+            <a:cxnSpLocks/>
+            <a:stCxn id="23" idx="2"/>
+            <a:endCxn id="29" idx="6"/>
+          </p:cNvCxnSpPr>
+          <p:nvPr/>
+        </p:nvCxnSpPr>
+        <p:spPr>
+          <a:xfrm flipH="1" flipV="1">
+            <a:off x="3841384" y="1295398"/>
+            <a:ext cx="1129554" cy="1667437"/>
+          </a:xfrm>
+          <a:prstGeom prst="straightConnector1">
+            <a:avLst/>
+          </a:prstGeom>
+          <a:ln w="28575">
+            <a:headEnd type="none" w="med" len="med"/>
+            <a:tailEnd type="none" w="med" len="med"/>
+          </a:ln>
+        </p:spPr>
+        <p:style>
+          <a:lnRef idx="1">
+            <a:schemeClr val="dk1"/>
+          </a:lnRef>
+          <a:fillRef idx="0">
+            <a:schemeClr val="dk1"/>
+          </a:fillRef>
+          <a:effectRef idx="0">
+            <a:schemeClr val="dk1"/>
+          </a:effectRef>
+          <a:fontRef idx="minor">
+            <a:schemeClr val="tx1"/>
+          </a:fontRef>
+        </p:style>
+      </p:cxnSp>
+      <p:cxnSp>
+        <p:nvCxnSpPr>
+          <p:cNvPr id="46" name="Straight Arrow Connector 45">
+            <a:extLst>
+              <a:ext uri="{FF2B5EF4-FFF2-40B4-BE49-F238E27FC236}">
+                <a16:creationId xmlns:a16="http://schemas.microsoft.com/office/drawing/2014/main" id="{9B5D9222-B189-DC45-AF7B-40349EB4F957}"/>
+              </a:ext>
+            </a:extLst>
+          </p:cNvPr>
+          <p:cNvCxnSpPr>
+            <a:cxnSpLocks/>
+            <a:stCxn id="23" idx="2"/>
+            <a:endCxn id="42" idx="5"/>
+          </p:cNvCxnSpPr>
+          <p:nvPr/>
+        </p:nvCxnSpPr>
+        <p:spPr>
+          <a:xfrm flipH="1" flipV="1">
+            <a:off x="3791494" y="2249557"/>
+            <a:ext cx="1179444" cy="713278"/>
+          </a:xfrm>
+          <a:prstGeom prst="straightConnector1">
+            <a:avLst/>
+          </a:prstGeom>
+          <a:ln w="12700">
+            <a:solidFill>
+              <a:schemeClr val="tx1">
+                <a:lumMod val="50000"/>
+                <a:lumOff val="50000"/>
+              </a:schemeClr>
+            </a:solidFill>
+            <a:prstDash val="dash"/>
+            <a:headEnd type="none" w="med" len="med"/>
+            <a:tailEnd type="none" w="med" len="med"/>
+          </a:ln>
+        </p:spPr>
+        <p:style>
+          <a:lnRef idx="1">
+            <a:schemeClr val="dk1"/>
+          </a:lnRef>
+          <a:fillRef idx="0">
+            <a:schemeClr val="dk1"/>
+          </a:fillRef>
+          <a:effectRef idx="0">
+            <a:schemeClr val="dk1"/>
+          </a:effectRef>
+          <a:fontRef idx="minor">
+            <a:schemeClr val="tx1"/>
+          </a:fontRef>
+        </p:style>
+      </p:cxnSp>
+      <p:cxnSp>
+        <p:nvCxnSpPr>
+          <p:cNvPr id="47" name="Straight Arrow Connector 46">
+            <a:extLst>
+              <a:ext uri="{FF2B5EF4-FFF2-40B4-BE49-F238E27FC236}">
+                <a16:creationId xmlns:a16="http://schemas.microsoft.com/office/drawing/2014/main" id="{279E266E-382F-9B40-9A02-1EF7D7930815}"/>
+              </a:ext>
+            </a:extLst>
+          </p:cNvPr>
+          <p:cNvCxnSpPr>
+            <a:cxnSpLocks/>
+            <a:stCxn id="23" idx="2"/>
+            <a:endCxn id="43" idx="6"/>
+          </p:cNvCxnSpPr>
+          <p:nvPr/>
+        </p:nvCxnSpPr>
+        <p:spPr>
+          <a:xfrm flipH="1">
+            <a:off x="3841383" y="2962835"/>
+            <a:ext cx="1129555" cy="833718"/>
+          </a:xfrm>
+          <a:prstGeom prst="straightConnector1">
+            <a:avLst/>
+          </a:prstGeom>
+          <a:ln w="12700">
+            <a:solidFill>
+              <a:schemeClr val="tx1">
+                <a:lumMod val="50000"/>
+                <a:lumOff val="50000"/>
+              </a:schemeClr>
+            </a:solidFill>
+            <a:prstDash val="dash"/>
+            <a:headEnd type="none" w="med" len="med"/>
+            <a:tailEnd type="none" w="med" len="med"/>
+          </a:ln>
+        </p:spPr>
+        <p:style>
+          <a:lnRef idx="1">
+            <a:schemeClr val="dk1"/>
+          </a:lnRef>
+          <a:fillRef idx="0">
+            <a:schemeClr val="dk1"/>
+          </a:fillRef>
+          <a:effectRef idx="0">
+            <a:schemeClr val="dk1"/>
+          </a:effectRef>
+          <a:fontRef idx="minor">
+            <a:schemeClr val="tx1"/>
+          </a:fontRef>
+        </p:style>
+      </p:cxnSp>
+      <p:cxnSp>
+        <p:nvCxnSpPr>
+          <p:cNvPr id="49" name="Straight Arrow Connector 48">
+            <a:extLst>
+              <a:ext uri="{FF2B5EF4-FFF2-40B4-BE49-F238E27FC236}">
+                <a16:creationId xmlns:a16="http://schemas.microsoft.com/office/drawing/2014/main" id="{33D1344A-8AF6-0C4B-928D-FBBAC854FB43}"/>
+              </a:ext>
+            </a:extLst>
+          </p:cNvPr>
+          <p:cNvCxnSpPr>
+            <a:cxnSpLocks/>
+            <a:stCxn id="23" idx="2"/>
+            <a:endCxn id="44" idx="6"/>
+          </p:cNvCxnSpPr>
+          <p:nvPr/>
+        </p:nvCxnSpPr>
+        <p:spPr>
+          <a:xfrm flipH="1">
+            <a:off x="3841382" y="2962835"/>
+            <a:ext cx="1129556" cy="1667436"/>
+          </a:xfrm>
+          <a:prstGeom prst="straightConnector1">
+            <a:avLst/>
+          </a:prstGeom>
+          <a:ln w="12700">
+            <a:solidFill>
+              <a:schemeClr val="tx1">
+                <a:lumMod val="50000"/>
+                <a:lumOff val="50000"/>
+              </a:schemeClr>
+            </a:solidFill>
+            <a:prstDash val="dash"/>
+            <a:headEnd type="none" w="med" len="med"/>
+            <a:tailEnd type="none" w="med" len="med"/>
+          </a:ln>
+        </p:spPr>
+        <p:style>
+          <a:lnRef idx="1">
+            <a:schemeClr val="dk1"/>
+          </a:lnRef>
+          <a:fillRef idx="0">
+            <a:schemeClr val="dk1"/>
+          </a:fillRef>
+          <a:effectRef idx="0">
+            <a:schemeClr val="dk1"/>
+          </a:effectRef>
+          <a:fontRef idx="minor">
+            <a:schemeClr val="tx1"/>
+          </a:fontRef>
+        </p:style>
+      </p:cxnSp>
+      <p:sp>
+        <p:nvSpPr>
+          <p:cNvPr id="52" name="Oval 51">
+            <a:extLst>
+              <a:ext uri="{FF2B5EF4-FFF2-40B4-BE49-F238E27FC236}">
+                <a16:creationId xmlns:a16="http://schemas.microsoft.com/office/drawing/2014/main" id="{717CE52A-BE57-3C43-BBAD-F2E3210C14DF}"/>
+              </a:ext>
+            </a:extLst>
+          </p:cNvPr>
+          <p:cNvSpPr/>
+          <p:nvPr/>
+        </p:nvSpPr>
+        <p:spPr>
+          <a:xfrm>
+            <a:off x="2348761" y="1125068"/>
+            <a:ext cx="340660" cy="340660"/>
+          </a:xfrm>
+          <a:prstGeom prst="ellipse">
+            <a:avLst/>
+          </a:prstGeom>
+        </p:spPr>
+        <p:style>
+          <a:lnRef idx="2">
+            <a:schemeClr val="dk1"/>
+          </a:lnRef>
+          <a:fillRef idx="1">
+            <a:schemeClr val="lt1"/>
+          </a:fillRef>
+          <a:effectRef idx="0">
+            <a:schemeClr val="dk1"/>
+          </a:effectRef>
+          <a:fontRef idx="minor">
+            <a:schemeClr val="dk1"/>
+          </a:fontRef>
+        </p:style>
+        <p:txBody>
+          <a:bodyPr rtlCol="0" anchor="ctr"/>
+          <a:lstStyle/>
+          <a:p>
+            <a:pPr algn="ctr"/>
+            <a:endParaRPr lang="en-US" sz="1000" b="1" dirty="0">
+              <a:latin typeface="Times" pitchFamily="2" charset="0"/>
+              <a:cs typeface="Arial" panose="020B0604020202020204" pitchFamily="34" charset="0"/>
+            </a:endParaRPr>
+          </a:p>
+        </p:txBody>
+      </p:sp>
+      <p:sp>
+        <p:nvSpPr>
+          <p:cNvPr id="53" name="Oval 52">
+            <a:extLst>
+              <a:ext uri="{FF2B5EF4-FFF2-40B4-BE49-F238E27FC236}">
+                <a16:creationId xmlns:a16="http://schemas.microsoft.com/office/drawing/2014/main" id="{9A6E7239-3C69-A140-8ECA-05805DE4D56C}"/>
+              </a:ext>
+            </a:extLst>
+          </p:cNvPr>
+          <p:cNvSpPr/>
+          <p:nvPr/>
+        </p:nvSpPr>
+        <p:spPr>
+          <a:xfrm>
+            <a:off x="2348762" y="2792505"/>
+            <a:ext cx="340660" cy="340660"/>
+          </a:xfrm>
+          <a:prstGeom prst="ellipse">
+            <a:avLst/>
+          </a:prstGeom>
+        </p:spPr>
+        <p:style>
+          <a:lnRef idx="2">
+            <a:schemeClr val="dk1"/>
+          </a:lnRef>
+          <a:fillRef idx="1">
+            <a:schemeClr val="lt1"/>
+          </a:fillRef>
+          <a:effectRef idx="0">
+            <a:schemeClr val="dk1"/>
+          </a:effectRef>
+          <a:fontRef idx="minor">
+            <a:schemeClr val="dk1"/>
+          </a:fontRef>
+        </p:style>
+        <p:txBody>
+          <a:bodyPr rtlCol="0" anchor="ctr"/>
+          <a:lstStyle/>
+          <a:p>
+            <a:pPr algn="ctr"/>
+            <a:endParaRPr lang="en-US" sz="1000" b="1" dirty="0">
+              <a:latin typeface="Times" pitchFamily="2" charset="0"/>
+              <a:cs typeface="Arial" panose="020B0604020202020204" pitchFamily="34" charset="0"/>
+            </a:endParaRPr>
+          </a:p>
+        </p:txBody>
+      </p:sp>
+      <p:sp>
+        <p:nvSpPr>
+          <p:cNvPr id="54" name="Oval 53">
+            <a:extLst>
+              <a:ext uri="{FF2B5EF4-FFF2-40B4-BE49-F238E27FC236}">
+                <a16:creationId xmlns:a16="http://schemas.microsoft.com/office/drawing/2014/main" id="{278C1316-B96C-F247-A6B8-C4F057DE807D}"/>
+              </a:ext>
+            </a:extLst>
+          </p:cNvPr>
+          <p:cNvSpPr/>
+          <p:nvPr/>
+        </p:nvSpPr>
+        <p:spPr>
+          <a:xfrm>
+            <a:off x="2348760" y="1958786"/>
+            <a:ext cx="340660" cy="340660"/>
+          </a:xfrm>
+          <a:prstGeom prst="ellipse">
+            <a:avLst/>
+          </a:prstGeom>
+        </p:spPr>
+        <p:style>
+          <a:lnRef idx="2">
+            <a:schemeClr val="dk1"/>
+          </a:lnRef>
+          <a:fillRef idx="1">
+            <a:schemeClr val="lt1"/>
+          </a:fillRef>
+          <a:effectRef idx="0">
+            <a:schemeClr val="dk1"/>
+          </a:effectRef>
+          <a:fontRef idx="minor">
+            <a:schemeClr val="dk1"/>
+          </a:fontRef>
+        </p:style>
+        <p:txBody>
+          <a:bodyPr rtlCol="0" anchor="ctr"/>
+          <a:lstStyle/>
+          <a:p>
+            <a:pPr algn="ctr"/>
+            <a:endParaRPr lang="en-US" sz="1000" b="1" dirty="0">
+              <a:latin typeface="Times" pitchFamily="2" charset="0"/>
+              <a:cs typeface="Arial" panose="020B0604020202020204" pitchFamily="34" charset="0"/>
+            </a:endParaRPr>
+          </a:p>
+        </p:txBody>
+      </p:sp>
+      <p:sp>
+        <p:nvSpPr>
+          <p:cNvPr id="55" name="Oval 54">
+            <a:extLst>
+              <a:ext uri="{FF2B5EF4-FFF2-40B4-BE49-F238E27FC236}">
+                <a16:creationId xmlns:a16="http://schemas.microsoft.com/office/drawing/2014/main" id="{F087548A-6C89-3D40-85FF-E10EA0C29C0C}"/>
+              </a:ext>
+            </a:extLst>
+          </p:cNvPr>
+          <p:cNvSpPr/>
+          <p:nvPr/>
+        </p:nvSpPr>
+        <p:spPr>
+          <a:xfrm>
+            <a:off x="2348760" y="3626223"/>
+            <a:ext cx="340660" cy="340660"/>
+          </a:xfrm>
+          <a:prstGeom prst="ellipse">
+            <a:avLst/>
+          </a:prstGeom>
+        </p:spPr>
+        <p:style>
+          <a:lnRef idx="2">
+            <a:schemeClr val="dk1"/>
+          </a:lnRef>
+          <a:fillRef idx="1">
+            <a:schemeClr val="lt1"/>
+          </a:fillRef>
+          <a:effectRef idx="0">
+            <a:schemeClr val="dk1"/>
+          </a:effectRef>
+          <a:fontRef idx="minor">
+            <a:schemeClr val="dk1"/>
+          </a:fontRef>
+        </p:style>
+        <p:txBody>
+          <a:bodyPr rtlCol="0" anchor="ctr"/>
+          <a:lstStyle/>
+          <a:p>
+            <a:pPr algn="ctr"/>
+            <a:endParaRPr lang="en-US" sz="1000" b="1" dirty="0">
+              <a:latin typeface="Times" pitchFamily="2" charset="0"/>
+              <a:cs typeface="Arial" panose="020B0604020202020204" pitchFamily="34" charset="0"/>
+            </a:endParaRPr>
+          </a:p>
+        </p:txBody>
+      </p:sp>
+      <p:sp>
+        <p:nvSpPr>
+          <p:cNvPr id="56" name="Oval 55">
+            <a:extLst>
+              <a:ext uri="{FF2B5EF4-FFF2-40B4-BE49-F238E27FC236}">
+                <a16:creationId xmlns:a16="http://schemas.microsoft.com/office/drawing/2014/main" id="{CB0C3EAD-E5E6-F546-8AC3-459D8E095385}"/>
+              </a:ext>
+            </a:extLst>
+          </p:cNvPr>
+          <p:cNvSpPr/>
+          <p:nvPr/>
+        </p:nvSpPr>
+        <p:spPr>
+          <a:xfrm>
+            <a:off x="2348759" y="4459941"/>
+            <a:ext cx="340660" cy="340660"/>
+          </a:xfrm>
+          <a:prstGeom prst="ellipse">
+            <a:avLst/>
+          </a:prstGeom>
+        </p:spPr>
+        <p:style>
+          <a:lnRef idx="2">
+            <a:schemeClr val="dk1"/>
+          </a:lnRef>
+          <a:fillRef idx="1">
+            <a:schemeClr val="lt1"/>
+          </a:fillRef>
+          <a:effectRef idx="0">
+            <a:schemeClr val="dk1"/>
+          </a:effectRef>
+          <a:fontRef idx="minor">
+            <a:schemeClr val="dk1"/>
+          </a:fontRef>
+        </p:style>
+        <p:txBody>
+          <a:bodyPr rtlCol="0" anchor="ctr"/>
+          <a:lstStyle/>
+          <a:p>
+            <a:pPr algn="ctr"/>
+            <a:endParaRPr lang="en-US" sz="1000" b="1" dirty="0">
+              <a:latin typeface="Times" pitchFamily="2" charset="0"/>
+              <a:cs typeface="Arial" panose="020B0604020202020204" pitchFamily="34" charset="0"/>
+            </a:endParaRPr>
+          </a:p>
+        </p:txBody>
+      </p:sp>
+      <p:sp>
+        <p:nvSpPr>
+          <p:cNvPr id="57" name="Oval 56">
+            <a:extLst>
+              <a:ext uri="{FF2B5EF4-FFF2-40B4-BE49-F238E27FC236}">
+                <a16:creationId xmlns:a16="http://schemas.microsoft.com/office/drawing/2014/main" id="{2074C952-D7D2-0747-8982-49500303E279}"/>
+              </a:ext>
+            </a:extLst>
+          </p:cNvPr>
+          <p:cNvSpPr/>
+          <p:nvPr/>
+        </p:nvSpPr>
+        <p:spPr>
+          <a:xfrm>
+            <a:off x="10367673" y="2792505"/>
+            <a:ext cx="340660" cy="340660"/>
+          </a:xfrm>
+          <a:prstGeom prst="ellipse">
+            <a:avLst/>
+          </a:prstGeom>
+        </p:spPr>
+        <p:style>
+          <a:lnRef idx="2">
+            <a:schemeClr val="dk1"/>
+          </a:lnRef>
+          <a:fillRef idx="1">
+            <a:schemeClr val="lt1"/>
+          </a:fillRef>
+          <a:effectRef idx="0">
+            <a:schemeClr val="dk1"/>
+          </a:effectRef>
+          <a:fontRef idx="minor">
+            <a:schemeClr val="dk1"/>
+          </a:fontRef>
+        </p:style>
+        <p:txBody>
+          <a:bodyPr rtlCol="0" anchor="ctr"/>
+          <a:lstStyle/>
+          <a:p>
+            <a:pPr algn="ctr"/>
+            <a:endParaRPr lang="en-US" sz="1000" b="1" dirty="0">
+              <a:latin typeface="Times" pitchFamily="2" charset="0"/>
+              <a:cs typeface="Arial" panose="020B0604020202020204" pitchFamily="34" charset="0"/>
+            </a:endParaRPr>
+          </a:p>
+        </p:txBody>
+      </p:sp>
+      <p:sp>
+        <p:nvSpPr>
+          <p:cNvPr id="58" name="Oval 57">
+            <a:extLst>
+              <a:ext uri="{FF2B5EF4-FFF2-40B4-BE49-F238E27FC236}">
+                <a16:creationId xmlns:a16="http://schemas.microsoft.com/office/drawing/2014/main" id="{B1BF5A31-33E2-F24A-9B4E-5DDC5F8ADA3E}"/>
+              </a:ext>
+            </a:extLst>
+          </p:cNvPr>
+          <p:cNvSpPr/>
+          <p:nvPr/>
+        </p:nvSpPr>
+        <p:spPr>
+          <a:xfrm>
+            <a:off x="8897459" y="1125068"/>
+            <a:ext cx="340660" cy="340660"/>
+          </a:xfrm>
+          <a:prstGeom prst="ellipse">
+            <a:avLst/>
+          </a:prstGeom>
+        </p:spPr>
+        <p:style>
+          <a:lnRef idx="2">
+            <a:schemeClr val="dk1"/>
+          </a:lnRef>
+          <a:fillRef idx="1">
+            <a:schemeClr val="lt1"/>
+          </a:fillRef>
+          <a:effectRef idx="0">
+            <a:schemeClr val="dk1"/>
+          </a:effectRef>
+          <a:fontRef idx="minor">
+            <a:schemeClr val="dk1"/>
+          </a:fontRef>
+        </p:style>
+        <p:txBody>
+          <a:bodyPr rtlCol="0" anchor="ctr"/>
+          <a:lstStyle/>
+          <a:p>
+            <a:pPr algn="ctr"/>
+            <a:endParaRPr lang="en-US" sz="1000" b="1" dirty="0">
+              <a:latin typeface="Times" pitchFamily="2" charset="0"/>
+              <a:cs typeface="Arial" panose="020B0604020202020204" pitchFamily="34" charset="0"/>
+            </a:endParaRPr>
+          </a:p>
+        </p:txBody>
+      </p:sp>
+      <p:sp>
+        <p:nvSpPr>
+          <p:cNvPr id="59" name="Oval 58">
+            <a:extLst>
+              <a:ext uri="{FF2B5EF4-FFF2-40B4-BE49-F238E27FC236}">
+                <a16:creationId xmlns:a16="http://schemas.microsoft.com/office/drawing/2014/main" id="{499FEEA3-6490-654E-AAA7-B49A804770FD}"/>
+              </a:ext>
+            </a:extLst>
+          </p:cNvPr>
+          <p:cNvSpPr/>
+          <p:nvPr/>
+        </p:nvSpPr>
+        <p:spPr>
+          <a:xfrm>
+            <a:off x="8897460" y="2792505"/>
+            <a:ext cx="340660" cy="340660"/>
+          </a:xfrm>
+          <a:prstGeom prst="ellipse">
+            <a:avLst/>
+          </a:prstGeom>
+        </p:spPr>
+        <p:style>
+          <a:lnRef idx="2">
+            <a:schemeClr val="dk1"/>
+          </a:lnRef>
+          <a:fillRef idx="1">
+            <a:schemeClr val="lt1"/>
+          </a:fillRef>
+          <a:effectRef idx="0">
+            <a:schemeClr val="dk1"/>
+          </a:effectRef>
+          <a:fontRef idx="minor">
+            <a:schemeClr val="dk1"/>
+          </a:fontRef>
+        </p:style>
+        <p:txBody>
+          <a:bodyPr rtlCol="0" anchor="ctr"/>
+          <a:lstStyle/>
+          <a:p>
+            <a:pPr algn="ctr"/>
+            <a:endParaRPr lang="en-US" sz="1000" b="1" dirty="0">
+              <a:latin typeface="Times" pitchFamily="2" charset="0"/>
+              <a:cs typeface="Arial" panose="020B0604020202020204" pitchFamily="34" charset="0"/>
+            </a:endParaRPr>
+          </a:p>
+        </p:txBody>
+      </p:sp>
+      <p:sp>
+        <p:nvSpPr>
+          <p:cNvPr id="60" name="Oval 59">
+            <a:extLst>
+              <a:ext uri="{FF2B5EF4-FFF2-40B4-BE49-F238E27FC236}">
+                <a16:creationId xmlns:a16="http://schemas.microsoft.com/office/drawing/2014/main" id="{E5C4D11C-1324-4C4D-B60A-FE42F2D1869F}"/>
+              </a:ext>
+            </a:extLst>
+          </p:cNvPr>
+          <p:cNvSpPr/>
+          <p:nvPr/>
+        </p:nvSpPr>
+        <p:spPr>
+          <a:xfrm>
+            <a:off x="8897458" y="1958786"/>
+            <a:ext cx="340660" cy="340660"/>
+          </a:xfrm>
+          <a:prstGeom prst="ellipse">
+            <a:avLst/>
+          </a:prstGeom>
+        </p:spPr>
+        <p:style>
+          <a:lnRef idx="2">
+            <a:schemeClr val="dk1"/>
+          </a:lnRef>
+          <a:fillRef idx="1">
+            <a:schemeClr val="lt1"/>
+          </a:fillRef>
+          <a:effectRef idx="0">
+            <a:schemeClr val="dk1"/>
+          </a:effectRef>
+          <a:fontRef idx="minor">
+            <a:schemeClr val="dk1"/>
+          </a:fontRef>
+        </p:style>
+        <p:txBody>
+          <a:bodyPr rtlCol="0" anchor="ctr"/>
+          <a:lstStyle/>
+          <a:p>
+            <a:pPr algn="ctr"/>
+            <a:endParaRPr lang="en-US" sz="1000" b="1" dirty="0">
+              <a:latin typeface="Times" pitchFamily="2" charset="0"/>
+              <a:cs typeface="Arial" panose="020B0604020202020204" pitchFamily="34" charset="0"/>
+            </a:endParaRPr>
+          </a:p>
+        </p:txBody>
+      </p:sp>
+      <p:sp>
+        <p:nvSpPr>
+          <p:cNvPr id="61" name="Oval 60">
+            <a:extLst>
+              <a:ext uri="{FF2B5EF4-FFF2-40B4-BE49-F238E27FC236}">
+                <a16:creationId xmlns:a16="http://schemas.microsoft.com/office/drawing/2014/main" id="{83F8F50C-1190-5D4B-A404-9A570291F2A3}"/>
+              </a:ext>
+            </a:extLst>
+          </p:cNvPr>
+          <p:cNvSpPr/>
+          <p:nvPr/>
+        </p:nvSpPr>
+        <p:spPr>
+          <a:xfrm>
+            <a:off x="8897458" y="3626223"/>
+            <a:ext cx="340660" cy="340660"/>
+          </a:xfrm>
+          <a:prstGeom prst="ellipse">
+            <a:avLst/>
+          </a:prstGeom>
+        </p:spPr>
+        <p:style>
+          <a:lnRef idx="2">
+            <a:schemeClr val="dk1"/>
+          </a:lnRef>
+          <a:fillRef idx="1">
+            <a:schemeClr val="lt1"/>
+          </a:fillRef>
+          <a:effectRef idx="0">
+            <a:schemeClr val="dk1"/>
+          </a:effectRef>
+          <a:fontRef idx="minor">
+            <a:schemeClr val="dk1"/>
+          </a:fontRef>
+        </p:style>
+        <p:txBody>
+          <a:bodyPr rtlCol="0" anchor="ctr"/>
+          <a:lstStyle/>
+          <a:p>
+            <a:pPr algn="ctr"/>
+            <a:endParaRPr lang="en-US" sz="1000" b="1" dirty="0">
+              <a:latin typeface="Times" pitchFamily="2" charset="0"/>
+              <a:cs typeface="Arial" panose="020B0604020202020204" pitchFamily="34" charset="0"/>
+            </a:endParaRPr>
+          </a:p>
+        </p:txBody>
+      </p:sp>
+      <p:sp>
+        <p:nvSpPr>
+          <p:cNvPr id="62" name="Oval 61">
+            <a:extLst>
+              <a:ext uri="{FF2B5EF4-FFF2-40B4-BE49-F238E27FC236}">
+                <a16:creationId xmlns:a16="http://schemas.microsoft.com/office/drawing/2014/main" id="{C41A85C4-49ED-CF44-A2AD-86A07E821FE0}"/>
+              </a:ext>
+            </a:extLst>
+          </p:cNvPr>
+          <p:cNvSpPr/>
+          <p:nvPr/>
+        </p:nvSpPr>
+        <p:spPr>
+          <a:xfrm>
+            <a:off x="8897457" y="4459941"/>
+            <a:ext cx="340660" cy="340660"/>
+          </a:xfrm>
+          <a:prstGeom prst="ellipse">
+            <a:avLst/>
+          </a:prstGeom>
+        </p:spPr>
+        <p:style>
+          <a:lnRef idx="2">
+            <a:schemeClr val="dk1"/>
+          </a:lnRef>
+          <a:fillRef idx="1">
+            <a:schemeClr val="lt1"/>
+          </a:fillRef>
+          <a:effectRef idx="0">
+            <a:schemeClr val="dk1"/>
+          </a:effectRef>
+          <a:fontRef idx="minor">
+            <a:schemeClr val="dk1"/>
+          </a:fontRef>
+        </p:style>
+        <p:txBody>
+          <a:bodyPr rtlCol="0" anchor="ctr"/>
+          <a:lstStyle/>
+          <a:p>
+            <a:pPr algn="ctr"/>
+            <a:endParaRPr lang="en-US" sz="1000" b="1" dirty="0">
+              <a:latin typeface="Times" pitchFamily="2" charset="0"/>
+              <a:cs typeface="Arial" panose="020B0604020202020204" pitchFamily="34" charset="0"/>
+            </a:endParaRPr>
+          </a:p>
+        </p:txBody>
+      </p:sp>
+      <p:cxnSp>
+        <p:nvCxnSpPr>
+          <p:cNvPr id="63" name="Straight Arrow Connector 62">
+            <a:extLst>
+              <a:ext uri="{FF2B5EF4-FFF2-40B4-BE49-F238E27FC236}">
+                <a16:creationId xmlns:a16="http://schemas.microsoft.com/office/drawing/2014/main" id="{60AFE7C1-C8A0-BE46-B971-086F532897D8}"/>
+              </a:ext>
+            </a:extLst>
+          </p:cNvPr>
+          <p:cNvCxnSpPr>
+            <a:stCxn id="57" idx="2"/>
+            <a:endCxn id="59" idx="6"/>
+          </p:cNvCxnSpPr>
+          <p:nvPr/>
+        </p:nvCxnSpPr>
+        <p:spPr>
+          <a:xfrm flipH="1">
+            <a:off x="9238120" y="2962835"/>
+            <a:ext cx="1129553" cy="0"/>
+          </a:xfrm>
+          <a:prstGeom prst="straightConnector1">
+            <a:avLst/>
+          </a:prstGeom>
+          <a:ln w="28575">
+            <a:headEnd type="none" w="med" len="med"/>
+            <a:tailEnd type="none" w="med" len="med"/>
+          </a:ln>
+        </p:spPr>
+        <p:style>
+          <a:lnRef idx="1">
+            <a:schemeClr val="dk1"/>
+          </a:lnRef>
+          <a:fillRef idx="0">
+            <a:schemeClr val="dk1"/>
+          </a:fillRef>
+          <a:effectRef idx="0">
+            <a:schemeClr val="dk1"/>
+          </a:effectRef>
+          <a:fontRef idx="minor">
+            <a:schemeClr val="tx1"/>
+          </a:fontRef>
+        </p:style>
+      </p:cxnSp>
+      <p:cxnSp>
+        <p:nvCxnSpPr>
+          <p:cNvPr id="64" name="Straight Arrow Connector 63">
+            <a:extLst>
+              <a:ext uri="{FF2B5EF4-FFF2-40B4-BE49-F238E27FC236}">
+                <a16:creationId xmlns:a16="http://schemas.microsoft.com/office/drawing/2014/main" id="{CD5ACEEB-4788-674B-9793-3687DD2022B4}"/>
+              </a:ext>
+            </a:extLst>
+          </p:cNvPr>
+          <p:cNvCxnSpPr>
+            <a:cxnSpLocks/>
+            <a:stCxn id="57" idx="2"/>
+            <a:endCxn id="58" idx="6"/>
+          </p:cNvCxnSpPr>
+          <p:nvPr/>
+        </p:nvCxnSpPr>
+        <p:spPr>
+          <a:xfrm flipH="1" flipV="1">
+            <a:off x="9238119" y="1295398"/>
+            <a:ext cx="1129554" cy="1667437"/>
+          </a:xfrm>
+          <a:prstGeom prst="straightConnector1">
+            <a:avLst/>
+          </a:prstGeom>
+          <a:ln w="28575">
+            <a:headEnd type="none" w="med" len="med"/>
+            <a:tailEnd type="none" w="med" len="med"/>
+          </a:ln>
+        </p:spPr>
+        <p:style>
+          <a:lnRef idx="1">
+            <a:schemeClr val="dk1"/>
+          </a:lnRef>
+          <a:fillRef idx="0">
+            <a:schemeClr val="dk1"/>
+          </a:fillRef>
+          <a:effectRef idx="0">
+            <a:schemeClr val="dk1"/>
+          </a:effectRef>
+          <a:fontRef idx="minor">
+            <a:schemeClr val="tx1"/>
+          </a:fontRef>
+        </p:style>
+      </p:cxnSp>
+      <p:cxnSp>
+        <p:nvCxnSpPr>
+          <p:cNvPr id="65" name="Straight Arrow Connector 64">
+            <a:extLst>
+              <a:ext uri="{FF2B5EF4-FFF2-40B4-BE49-F238E27FC236}">
+                <a16:creationId xmlns:a16="http://schemas.microsoft.com/office/drawing/2014/main" id="{FC4B3AC6-2EF4-7F41-A1CC-E3E40F770FF2}"/>
+              </a:ext>
+            </a:extLst>
+          </p:cNvPr>
+          <p:cNvCxnSpPr>
+            <a:cxnSpLocks/>
+            <a:stCxn id="57" idx="2"/>
+            <a:endCxn id="60" idx="5"/>
+          </p:cNvCxnSpPr>
+          <p:nvPr/>
+        </p:nvCxnSpPr>
+        <p:spPr>
+          <a:xfrm flipH="1" flipV="1">
+            <a:off x="9188229" y="2249557"/>
+            <a:ext cx="1179444" cy="713278"/>
+          </a:xfrm>
+          <a:prstGeom prst="straightConnector1">
+            <a:avLst/>
+          </a:prstGeom>
+          <a:ln w="12700">
+            <a:solidFill>
+              <a:schemeClr val="tx1">
+                <a:lumMod val="50000"/>
+                <a:lumOff val="50000"/>
+              </a:schemeClr>
+            </a:solidFill>
+            <a:prstDash val="dash"/>
+            <a:headEnd type="none" w="med" len="med"/>
+            <a:tailEnd type="none" w="med" len="med"/>
+          </a:ln>
+        </p:spPr>
+        <p:style>
+          <a:lnRef idx="1">
+            <a:schemeClr val="dk1"/>
+          </a:lnRef>
+          <a:fillRef idx="0">
+            <a:schemeClr val="dk1"/>
+          </a:fillRef>
+          <a:effectRef idx="0">
+            <a:schemeClr val="dk1"/>
+          </a:effectRef>
+          <a:fontRef idx="minor">
+            <a:schemeClr val="tx1"/>
+          </a:fontRef>
+        </p:style>
+      </p:cxnSp>
+      <p:cxnSp>
+        <p:nvCxnSpPr>
+          <p:cNvPr id="66" name="Straight Arrow Connector 65">
+            <a:extLst>
+              <a:ext uri="{FF2B5EF4-FFF2-40B4-BE49-F238E27FC236}">
+                <a16:creationId xmlns:a16="http://schemas.microsoft.com/office/drawing/2014/main" id="{485D5951-666B-1544-9372-269F0047471F}"/>
+              </a:ext>
+            </a:extLst>
+          </p:cNvPr>
+          <p:cNvCxnSpPr>
+            <a:cxnSpLocks/>
+            <a:stCxn id="57" idx="2"/>
+            <a:endCxn id="61" idx="6"/>
+          </p:cNvCxnSpPr>
+          <p:nvPr/>
+        </p:nvCxnSpPr>
+        <p:spPr>
+          <a:xfrm flipH="1">
+            <a:off x="9238118" y="2962835"/>
+            <a:ext cx="1129555" cy="833718"/>
+          </a:xfrm>
+          <a:prstGeom prst="straightConnector1">
+            <a:avLst/>
+          </a:prstGeom>
+          <a:ln w="12700">
+            <a:solidFill>
+              <a:schemeClr val="tx1">
+                <a:lumMod val="50000"/>
+                <a:lumOff val="50000"/>
+              </a:schemeClr>
+            </a:solidFill>
+            <a:prstDash val="dash"/>
+            <a:headEnd type="none" w="med" len="med"/>
+            <a:tailEnd type="none" w="med" len="med"/>
+          </a:ln>
+        </p:spPr>
+        <p:style>
+          <a:lnRef idx="1">
+            <a:schemeClr val="dk1"/>
+          </a:lnRef>
+          <a:fillRef idx="0">
+            <a:schemeClr val="dk1"/>
+          </a:fillRef>
+          <a:effectRef idx="0">
+            <a:schemeClr val="dk1"/>
+          </a:effectRef>
+          <a:fontRef idx="minor">
+            <a:schemeClr val="tx1"/>
+          </a:fontRef>
+        </p:style>
+      </p:cxnSp>
+      <p:cxnSp>
+        <p:nvCxnSpPr>
+          <p:cNvPr id="67" name="Straight Arrow Connector 66">
+            <a:extLst>
+              <a:ext uri="{FF2B5EF4-FFF2-40B4-BE49-F238E27FC236}">
+                <a16:creationId xmlns:a16="http://schemas.microsoft.com/office/drawing/2014/main" id="{FBE879C5-019C-F14B-AE7C-EFE15F1A96A9}"/>
+              </a:ext>
+            </a:extLst>
+          </p:cNvPr>
+          <p:cNvCxnSpPr>
+            <a:cxnSpLocks/>
+            <a:stCxn id="57" idx="2"/>
+            <a:endCxn id="62" idx="6"/>
+          </p:cNvCxnSpPr>
+          <p:nvPr/>
+        </p:nvCxnSpPr>
+        <p:spPr>
+          <a:xfrm flipH="1">
+            <a:off x="9238117" y="2962835"/>
+            <a:ext cx="1129556" cy="1667436"/>
+          </a:xfrm>
+          <a:prstGeom prst="straightConnector1">
+            <a:avLst/>
+          </a:prstGeom>
+          <a:ln w="12700">
+            <a:solidFill>
+              <a:schemeClr val="tx1">
+                <a:lumMod val="50000"/>
+                <a:lumOff val="50000"/>
+              </a:schemeClr>
+            </a:solidFill>
+            <a:prstDash val="dash"/>
+            <a:headEnd type="none" w="med" len="med"/>
+            <a:tailEnd type="none" w="med" len="med"/>
+          </a:ln>
+        </p:spPr>
+        <p:style>
+          <a:lnRef idx="1">
+            <a:schemeClr val="dk1"/>
+          </a:lnRef>
+          <a:fillRef idx="0">
+            <a:schemeClr val="dk1"/>
+          </a:fillRef>
+          <a:effectRef idx="0">
+            <a:schemeClr val="dk1"/>
+          </a:effectRef>
+          <a:fontRef idx="minor">
+            <a:schemeClr val="tx1"/>
+          </a:fontRef>
+        </p:style>
+      </p:cxnSp>
+      <p:sp>
+        <p:nvSpPr>
+          <p:cNvPr id="68" name="Oval 67">
+            <a:extLst>
+              <a:ext uri="{FF2B5EF4-FFF2-40B4-BE49-F238E27FC236}">
+                <a16:creationId xmlns:a16="http://schemas.microsoft.com/office/drawing/2014/main" id="{04B224BA-9C17-D44C-BFC8-58ABA581A9B0}"/>
+              </a:ext>
+            </a:extLst>
+          </p:cNvPr>
+          <p:cNvSpPr/>
+          <p:nvPr/>
+        </p:nvSpPr>
+        <p:spPr>
+          <a:xfrm>
+            <a:off x="7745496" y="1125068"/>
+            <a:ext cx="340660" cy="340660"/>
+          </a:xfrm>
+          <a:prstGeom prst="ellipse">
+            <a:avLst/>
+          </a:prstGeom>
+        </p:spPr>
+        <p:style>
+          <a:lnRef idx="2">
+            <a:schemeClr val="dk1"/>
+          </a:lnRef>
+          <a:fillRef idx="1">
+            <a:schemeClr val="lt1"/>
+          </a:fillRef>
+          <a:effectRef idx="0">
+            <a:schemeClr val="dk1"/>
+          </a:effectRef>
+          <a:fontRef idx="minor">
+            <a:schemeClr val="dk1"/>
+          </a:fontRef>
+        </p:style>
+        <p:txBody>
+          <a:bodyPr rtlCol="0" anchor="ctr"/>
+          <a:lstStyle/>
+          <a:p>
+            <a:pPr algn="ctr"/>
+            <a:endParaRPr lang="en-US" sz="1000" b="1" dirty="0">
+              <a:latin typeface="Times" pitchFamily="2" charset="0"/>
+              <a:cs typeface="Arial" panose="020B0604020202020204" pitchFamily="34" charset="0"/>
+            </a:endParaRPr>
+          </a:p>
+        </p:txBody>
+      </p:sp>
+      <p:sp>
+        <p:nvSpPr>
+          <p:cNvPr id="69" name="Oval 68">
+            <a:extLst>
+              <a:ext uri="{FF2B5EF4-FFF2-40B4-BE49-F238E27FC236}">
+                <a16:creationId xmlns:a16="http://schemas.microsoft.com/office/drawing/2014/main" id="{24AC1A1E-1853-8D45-9135-DFD79C9AEBF0}"/>
+              </a:ext>
+            </a:extLst>
+          </p:cNvPr>
+          <p:cNvSpPr/>
+          <p:nvPr/>
+        </p:nvSpPr>
+        <p:spPr>
+          <a:xfrm>
+            <a:off x="7745497" y="2792505"/>
+            <a:ext cx="340660" cy="340660"/>
+          </a:xfrm>
+          <a:prstGeom prst="ellipse">
+            <a:avLst/>
+          </a:prstGeom>
+        </p:spPr>
+        <p:style>
+          <a:lnRef idx="2">
+            <a:schemeClr val="dk1"/>
+          </a:lnRef>
+          <a:fillRef idx="1">
+            <a:schemeClr val="lt1"/>
+          </a:fillRef>
+          <a:effectRef idx="0">
+            <a:schemeClr val="dk1"/>
+          </a:effectRef>
+          <a:fontRef idx="minor">
+            <a:schemeClr val="dk1"/>
+          </a:fontRef>
+        </p:style>
+        <p:txBody>
+          <a:bodyPr rtlCol="0" anchor="ctr"/>
+          <a:lstStyle/>
+          <a:p>
+            <a:pPr algn="ctr"/>
+            <a:endParaRPr lang="en-US" sz="1000" b="1" dirty="0">
+              <a:latin typeface="Times" pitchFamily="2" charset="0"/>
+              <a:cs typeface="Arial" panose="020B0604020202020204" pitchFamily="34" charset="0"/>
+            </a:endParaRPr>
+          </a:p>
+        </p:txBody>
+      </p:sp>
+      <p:sp>
+        <p:nvSpPr>
+          <p:cNvPr id="70" name="Oval 69">
+            <a:extLst>
+              <a:ext uri="{FF2B5EF4-FFF2-40B4-BE49-F238E27FC236}">
+                <a16:creationId xmlns:a16="http://schemas.microsoft.com/office/drawing/2014/main" id="{C9C36DEF-41CA-D847-BD25-3A4FB4FDC5F6}"/>
+              </a:ext>
+            </a:extLst>
+          </p:cNvPr>
+          <p:cNvSpPr/>
+          <p:nvPr/>
+        </p:nvSpPr>
+        <p:spPr>
+          <a:xfrm>
+            <a:off x="7745495" y="1958786"/>
+            <a:ext cx="340660" cy="340660"/>
+          </a:xfrm>
+          <a:prstGeom prst="ellipse">
+            <a:avLst/>
+          </a:prstGeom>
+        </p:spPr>
+        <p:style>
+          <a:lnRef idx="2">
+            <a:schemeClr val="dk1"/>
+          </a:lnRef>
+          <a:fillRef idx="1">
+            <a:schemeClr val="lt1"/>
+          </a:fillRef>
+          <a:effectRef idx="0">
+            <a:schemeClr val="dk1"/>
+          </a:effectRef>
+          <a:fontRef idx="minor">
+            <a:schemeClr val="dk1"/>
+          </a:fontRef>
+        </p:style>
+        <p:txBody>
+          <a:bodyPr rtlCol="0" anchor="ctr"/>
+          <a:lstStyle/>
+          <a:p>
+            <a:pPr algn="ctr"/>
+            <a:endParaRPr lang="en-US" sz="1000" b="1" dirty="0">
+              <a:latin typeface="Times" pitchFamily="2" charset="0"/>
+              <a:cs typeface="Arial" panose="020B0604020202020204" pitchFamily="34" charset="0"/>
+            </a:endParaRPr>
+          </a:p>
+        </p:txBody>
+      </p:sp>
+      <p:sp>
+        <p:nvSpPr>
+          <p:cNvPr id="71" name="Oval 70">
+            <a:extLst>
+              <a:ext uri="{FF2B5EF4-FFF2-40B4-BE49-F238E27FC236}">
+                <a16:creationId xmlns:a16="http://schemas.microsoft.com/office/drawing/2014/main" id="{288EE2CF-FFE6-F34A-BC89-CC514176689B}"/>
+              </a:ext>
+            </a:extLst>
+          </p:cNvPr>
+          <p:cNvSpPr/>
+          <p:nvPr/>
+        </p:nvSpPr>
+        <p:spPr>
+          <a:xfrm>
+            <a:off x="7745495" y="3626223"/>
+            <a:ext cx="340660" cy="340660"/>
+          </a:xfrm>
+          <a:prstGeom prst="ellipse">
+            <a:avLst/>
+          </a:prstGeom>
+        </p:spPr>
+        <p:style>
+          <a:lnRef idx="2">
+            <a:schemeClr val="dk1"/>
+          </a:lnRef>
+          <a:fillRef idx="1">
+            <a:schemeClr val="lt1"/>
+          </a:fillRef>
+          <a:effectRef idx="0">
+            <a:schemeClr val="dk1"/>
+          </a:effectRef>
+          <a:fontRef idx="minor">
+            <a:schemeClr val="dk1"/>
+          </a:fontRef>
+        </p:style>
+        <p:txBody>
+          <a:bodyPr rtlCol="0" anchor="ctr"/>
+          <a:lstStyle/>
+          <a:p>
+            <a:pPr algn="ctr"/>
+            <a:endParaRPr lang="en-US" sz="1000" b="1" dirty="0">
+              <a:latin typeface="Times" pitchFamily="2" charset="0"/>
+              <a:cs typeface="Arial" panose="020B0604020202020204" pitchFamily="34" charset="0"/>
+            </a:endParaRPr>
+          </a:p>
+        </p:txBody>
+      </p:sp>
+      <p:sp>
+        <p:nvSpPr>
+          <p:cNvPr id="72" name="Oval 71">
+            <a:extLst>
+              <a:ext uri="{FF2B5EF4-FFF2-40B4-BE49-F238E27FC236}">
+                <a16:creationId xmlns:a16="http://schemas.microsoft.com/office/drawing/2014/main" id="{3145F447-6C85-EC4E-BBC1-A231C4115874}"/>
+              </a:ext>
+            </a:extLst>
+          </p:cNvPr>
+          <p:cNvSpPr/>
+          <p:nvPr/>
+        </p:nvSpPr>
+        <p:spPr>
+          <a:xfrm>
+            <a:off x="7745494" y="4459941"/>
+            <a:ext cx="340660" cy="340660"/>
+          </a:xfrm>
+          <a:prstGeom prst="ellipse">
+            <a:avLst/>
+          </a:prstGeom>
+        </p:spPr>
+        <p:style>
+          <a:lnRef idx="2">
+            <a:schemeClr val="dk1"/>
+          </a:lnRef>
+          <a:fillRef idx="1">
+            <a:schemeClr val="lt1"/>
+          </a:fillRef>
+          <a:effectRef idx="0">
+            <a:schemeClr val="dk1"/>
+          </a:effectRef>
+          <a:fontRef idx="minor">
+            <a:schemeClr val="dk1"/>
+          </a:fontRef>
+        </p:style>
+        <p:txBody>
+          <a:bodyPr rtlCol="0" anchor="ctr"/>
+          <a:lstStyle/>
+          <a:p>
+            <a:pPr algn="ctr"/>
+            <a:endParaRPr lang="en-US" sz="1000" b="1" dirty="0">
+              <a:latin typeface="Times" pitchFamily="2" charset="0"/>
+              <a:cs typeface="Arial" panose="020B0604020202020204" pitchFamily="34" charset="0"/>
+            </a:endParaRPr>
+          </a:p>
+        </p:txBody>
+      </p:sp>
+      <p:cxnSp>
+        <p:nvCxnSpPr>
+          <p:cNvPr id="73" name="Straight Arrow Connector 72">
+            <a:extLst>
+              <a:ext uri="{FF2B5EF4-FFF2-40B4-BE49-F238E27FC236}">
+                <a16:creationId xmlns:a16="http://schemas.microsoft.com/office/drawing/2014/main" id="{EA81FB40-AD4B-604D-B1F0-CED9D4BFC1A1}"/>
+              </a:ext>
+            </a:extLst>
+          </p:cNvPr>
+          <p:cNvCxnSpPr>
+            <a:cxnSpLocks/>
+            <a:stCxn id="58" idx="2"/>
+            <a:endCxn id="70" idx="6"/>
+          </p:cNvCxnSpPr>
+          <p:nvPr/>
+        </p:nvCxnSpPr>
+        <p:spPr>
+          <a:xfrm flipH="1">
+            <a:off x="8086155" y="1295398"/>
+            <a:ext cx="811304" cy="833718"/>
+          </a:xfrm>
+          <a:prstGeom prst="straightConnector1">
+            <a:avLst/>
+          </a:prstGeom>
+          <a:ln w="28575">
+            <a:headEnd type="none" w="med" len="med"/>
+            <a:tailEnd type="none" w="med" len="med"/>
+          </a:ln>
+        </p:spPr>
+        <p:style>
+          <a:lnRef idx="1">
+            <a:schemeClr val="dk1"/>
+          </a:lnRef>
+          <a:fillRef idx="0">
+            <a:schemeClr val="dk1"/>
+          </a:fillRef>
+          <a:effectRef idx="0">
+            <a:schemeClr val="dk1"/>
+          </a:effectRef>
+          <a:fontRef idx="minor">
+            <a:schemeClr val="tx1"/>
+          </a:fontRef>
+        </p:style>
+      </p:cxnSp>
+      <p:cxnSp>
+        <p:nvCxnSpPr>
+          <p:cNvPr id="76" name="Straight Arrow Connector 75">
+            <a:extLst>
+              <a:ext uri="{FF2B5EF4-FFF2-40B4-BE49-F238E27FC236}">
+                <a16:creationId xmlns:a16="http://schemas.microsoft.com/office/drawing/2014/main" id="{826492BF-8B71-414B-B774-F5229BFCE6C8}"/>
+              </a:ext>
+            </a:extLst>
+          </p:cNvPr>
+          <p:cNvCxnSpPr>
+            <a:cxnSpLocks/>
+            <a:stCxn id="59" idx="2"/>
+            <a:endCxn id="69" idx="6"/>
+          </p:cNvCxnSpPr>
+          <p:nvPr/>
+        </p:nvCxnSpPr>
+        <p:spPr>
+          <a:xfrm flipH="1">
+            <a:off x="8086157" y="2962835"/>
+            <a:ext cx="811303" cy="0"/>
+          </a:xfrm>
+          <a:prstGeom prst="straightConnector1">
+            <a:avLst/>
+          </a:prstGeom>
+          <a:ln w="28575">
+            <a:headEnd type="none" w="med" len="med"/>
+            <a:tailEnd type="none" w="med" len="med"/>
+          </a:ln>
+        </p:spPr>
+        <p:style>
+          <a:lnRef idx="1">
+            <a:schemeClr val="dk1"/>
+          </a:lnRef>
+          <a:fillRef idx="0">
+            <a:schemeClr val="dk1"/>
+          </a:fillRef>
+          <a:effectRef idx="0">
+            <a:schemeClr val="dk1"/>
+          </a:effectRef>
+          <a:fontRef idx="minor">
+            <a:schemeClr val="tx1"/>
+          </a:fontRef>
+        </p:style>
+      </p:cxnSp>
+      <p:cxnSp>
+        <p:nvCxnSpPr>
+          <p:cNvPr id="79" name="Straight Arrow Connector 78">
+            <a:extLst>
+              <a:ext uri="{FF2B5EF4-FFF2-40B4-BE49-F238E27FC236}">
+                <a16:creationId xmlns:a16="http://schemas.microsoft.com/office/drawing/2014/main" id="{C6FAC76C-D94C-054B-9A90-27F08653B6C6}"/>
+              </a:ext>
+            </a:extLst>
+          </p:cNvPr>
+          <p:cNvCxnSpPr>
+            <a:cxnSpLocks/>
+            <a:stCxn id="58" idx="2"/>
+            <a:endCxn id="68" idx="6"/>
+          </p:cNvCxnSpPr>
+          <p:nvPr/>
+        </p:nvCxnSpPr>
+        <p:spPr>
+          <a:xfrm flipH="1">
+            <a:off x="8086156" y="1295398"/>
+            <a:ext cx="811303" cy="0"/>
+          </a:xfrm>
+          <a:prstGeom prst="straightConnector1">
+            <a:avLst/>
+          </a:prstGeom>
+          <a:ln w="12700">
+            <a:solidFill>
+              <a:schemeClr val="tx1">
+                <a:lumMod val="50000"/>
+                <a:lumOff val="50000"/>
+              </a:schemeClr>
+            </a:solidFill>
+            <a:prstDash val="dash"/>
+            <a:headEnd type="none" w="med" len="med"/>
+            <a:tailEnd type="none" w="med" len="med"/>
+          </a:ln>
+        </p:spPr>
+        <p:style>
+          <a:lnRef idx="1">
+            <a:schemeClr val="dk1"/>
+          </a:lnRef>
+          <a:fillRef idx="0">
+            <a:schemeClr val="dk1"/>
+          </a:fillRef>
+          <a:effectRef idx="0">
+            <a:schemeClr val="dk1"/>
+          </a:effectRef>
+          <a:fontRef idx="minor">
+            <a:schemeClr val="tx1"/>
+          </a:fontRef>
+        </p:style>
+      </p:cxnSp>
+      <p:cxnSp>
+        <p:nvCxnSpPr>
+          <p:cNvPr id="82" name="Straight Arrow Connector 81">
+            <a:extLst>
+              <a:ext uri="{FF2B5EF4-FFF2-40B4-BE49-F238E27FC236}">
+                <a16:creationId xmlns:a16="http://schemas.microsoft.com/office/drawing/2014/main" id="{C969FA85-EA30-D94D-B553-B829AE8FF502}"/>
+              </a:ext>
+            </a:extLst>
+          </p:cNvPr>
+          <p:cNvCxnSpPr>
+            <a:cxnSpLocks/>
+            <a:stCxn id="58" idx="2"/>
+            <a:endCxn id="69" idx="6"/>
+          </p:cNvCxnSpPr>
+          <p:nvPr/>
+        </p:nvCxnSpPr>
+        <p:spPr>
+          <a:xfrm flipH="1">
+            <a:off x="8086157" y="1295398"/>
+            <a:ext cx="811302" cy="1667437"/>
+          </a:xfrm>
+          <a:prstGeom prst="straightConnector1">
+            <a:avLst/>
+          </a:prstGeom>
+          <a:ln w="12700">
+            <a:solidFill>
+              <a:schemeClr val="tx1">
+                <a:lumMod val="50000"/>
+                <a:lumOff val="50000"/>
+              </a:schemeClr>
+            </a:solidFill>
+            <a:prstDash val="dash"/>
+            <a:headEnd type="none" w="med" len="med"/>
+            <a:tailEnd type="none" w="med" len="med"/>
+          </a:ln>
+        </p:spPr>
+        <p:style>
+          <a:lnRef idx="1">
+            <a:schemeClr val="dk1"/>
+          </a:lnRef>
+          <a:fillRef idx="0">
+            <a:schemeClr val="dk1"/>
+          </a:fillRef>
+          <a:effectRef idx="0">
+            <a:schemeClr val="dk1"/>
+          </a:effectRef>
+          <a:fontRef idx="minor">
+            <a:schemeClr val="tx1"/>
+          </a:fontRef>
+        </p:style>
+      </p:cxnSp>
+      <p:cxnSp>
+        <p:nvCxnSpPr>
+          <p:cNvPr id="86" name="Straight Arrow Connector 85">
+            <a:extLst>
+              <a:ext uri="{FF2B5EF4-FFF2-40B4-BE49-F238E27FC236}">
+                <a16:creationId xmlns:a16="http://schemas.microsoft.com/office/drawing/2014/main" id="{30871312-3BB1-924D-8D55-7377C179CABC}"/>
+              </a:ext>
+            </a:extLst>
+          </p:cNvPr>
+          <p:cNvCxnSpPr>
+            <a:cxnSpLocks/>
+            <a:stCxn id="58" idx="2"/>
+            <a:endCxn id="71" idx="6"/>
+          </p:cNvCxnSpPr>
+          <p:nvPr/>
+        </p:nvCxnSpPr>
+        <p:spPr>
+          <a:xfrm flipH="1">
+            <a:off x="8086155" y="1295398"/>
+            <a:ext cx="811304" cy="2501155"/>
+          </a:xfrm>
+          <a:prstGeom prst="straightConnector1">
+            <a:avLst/>
+          </a:prstGeom>
+          <a:ln w="12700">
+            <a:solidFill>
+              <a:schemeClr val="tx1">
+                <a:lumMod val="50000"/>
+                <a:lumOff val="50000"/>
+              </a:schemeClr>
+            </a:solidFill>
+            <a:prstDash val="dash"/>
+            <a:headEnd type="none" w="med" len="med"/>
+            <a:tailEnd type="none" w="med" len="med"/>
+          </a:ln>
+        </p:spPr>
+        <p:style>
+          <a:lnRef idx="1">
+            <a:schemeClr val="dk1"/>
+          </a:lnRef>
+          <a:fillRef idx="0">
+            <a:schemeClr val="dk1"/>
+          </a:fillRef>
+          <a:effectRef idx="0">
+            <a:schemeClr val="dk1"/>
+          </a:effectRef>
+          <a:fontRef idx="minor">
+            <a:schemeClr val="tx1"/>
+          </a:fontRef>
+        </p:style>
+      </p:cxnSp>
+      <p:cxnSp>
+        <p:nvCxnSpPr>
+          <p:cNvPr id="89" name="Straight Arrow Connector 88">
+            <a:extLst>
+              <a:ext uri="{FF2B5EF4-FFF2-40B4-BE49-F238E27FC236}">
+                <a16:creationId xmlns:a16="http://schemas.microsoft.com/office/drawing/2014/main" id="{D31BA1EC-CB40-A740-9FC1-2A4FA05B61B3}"/>
+              </a:ext>
+            </a:extLst>
+          </p:cNvPr>
+          <p:cNvCxnSpPr>
+            <a:cxnSpLocks/>
+            <a:stCxn id="58" idx="2"/>
+            <a:endCxn id="72" idx="6"/>
+          </p:cNvCxnSpPr>
+          <p:nvPr/>
+        </p:nvCxnSpPr>
+        <p:spPr>
+          <a:xfrm flipH="1">
+            <a:off x="8086154" y="1295398"/>
+            <a:ext cx="811305" cy="3334873"/>
+          </a:xfrm>
+          <a:prstGeom prst="straightConnector1">
+            <a:avLst/>
+          </a:prstGeom>
+          <a:ln w="12700">
+            <a:solidFill>
+              <a:schemeClr val="tx1">
+                <a:lumMod val="50000"/>
+                <a:lumOff val="50000"/>
+              </a:schemeClr>
+            </a:solidFill>
+            <a:prstDash val="dash"/>
+            <a:headEnd type="none" w="med" len="med"/>
+            <a:tailEnd type="none" w="med" len="med"/>
+          </a:ln>
+        </p:spPr>
+        <p:style>
+          <a:lnRef idx="1">
+            <a:schemeClr val="dk1"/>
+          </a:lnRef>
+          <a:fillRef idx="0">
+            <a:schemeClr val="dk1"/>
+          </a:fillRef>
+          <a:effectRef idx="0">
+            <a:schemeClr val="dk1"/>
+          </a:effectRef>
+          <a:fontRef idx="minor">
+            <a:schemeClr val="tx1"/>
+          </a:fontRef>
+        </p:style>
+      </p:cxnSp>
+      <p:cxnSp>
+        <p:nvCxnSpPr>
+          <p:cNvPr id="92" name="Straight Arrow Connector 91">
+            <a:extLst>
+              <a:ext uri="{FF2B5EF4-FFF2-40B4-BE49-F238E27FC236}">
+                <a16:creationId xmlns:a16="http://schemas.microsoft.com/office/drawing/2014/main" id="{E1B70CDC-1FC8-7F4F-9963-3FAEC3C46FE6}"/>
+              </a:ext>
+            </a:extLst>
+          </p:cNvPr>
+          <p:cNvCxnSpPr>
+            <a:cxnSpLocks/>
+            <a:stCxn id="59" idx="2"/>
+            <a:endCxn id="72" idx="6"/>
+          </p:cNvCxnSpPr>
+          <p:nvPr/>
+        </p:nvCxnSpPr>
+        <p:spPr>
+          <a:xfrm flipH="1">
+            <a:off x="8086154" y="2962835"/>
+            <a:ext cx="811306" cy="1667436"/>
+          </a:xfrm>
+          <a:prstGeom prst="straightConnector1">
+            <a:avLst/>
+          </a:prstGeom>
+          <a:ln w="12700">
+            <a:solidFill>
+              <a:schemeClr val="tx1">
+                <a:lumMod val="50000"/>
+                <a:lumOff val="50000"/>
+              </a:schemeClr>
+            </a:solidFill>
+            <a:prstDash val="dash"/>
+            <a:headEnd type="none" w="med" len="med"/>
+            <a:tailEnd type="none" w="med" len="med"/>
+          </a:ln>
+        </p:spPr>
+        <p:style>
+          <a:lnRef idx="1">
+            <a:schemeClr val="dk1"/>
+          </a:lnRef>
+          <a:fillRef idx="0">
+            <a:schemeClr val="dk1"/>
+          </a:fillRef>
+          <a:effectRef idx="0">
+            <a:schemeClr val="dk1"/>
+          </a:effectRef>
+          <a:fontRef idx="minor">
+            <a:schemeClr val="tx1"/>
+          </a:fontRef>
+        </p:style>
+      </p:cxnSp>
+      <p:cxnSp>
+        <p:nvCxnSpPr>
+          <p:cNvPr id="95" name="Straight Arrow Connector 94">
+            <a:extLst>
+              <a:ext uri="{FF2B5EF4-FFF2-40B4-BE49-F238E27FC236}">
+                <a16:creationId xmlns:a16="http://schemas.microsoft.com/office/drawing/2014/main" id="{2EA8BF31-B530-AE49-9569-8AB489D4EFF7}"/>
+              </a:ext>
+            </a:extLst>
+          </p:cNvPr>
+          <p:cNvCxnSpPr>
+            <a:cxnSpLocks/>
+            <a:stCxn id="59" idx="2"/>
+            <a:endCxn id="71" idx="6"/>
+          </p:cNvCxnSpPr>
+          <p:nvPr/>
+        </p:nvCxnSpPr>
+        <p:spPr>
+          <a:xfrm flipH="1">
+            <a:off x="8086155" y="2962835"/>
+            <a:ext cx="811305" cy="833718"/>
+          </a:xfrm>
+          <a:prstGeom prst="straightConnector1">
+            <a:avLst/>
+          </a:prstGeom>
+          <a:ln w="12700">
+            <a:solidFill>
+              <a:schemeClr val="tx1">
+                <a:lumMod val="50000"/>
+                <a:lumOff val="50000"/>
+              </a:schemeClr>
+            </a:solidFill>
+            <a:prstDash val="dash"/>
+            <a:headEnd type="none" w="med" len="med"/>
+            <a:tailEnd type="none" w="med" len="med"/>
+          </a:ln>
+        </p:spPr>
+        <p:style>
+          <a:lnRef idx="1">
+            <a:schemeClr val="dk1"/>
+          </a:lnRef>
+          <a:fillRef idx="0">
+            <a:schemeClr val="dk1"/>
+          </a:fillRef>
+          <a:effectRef idx="0">
+            <a:schemeClr val="dk1"/>
+          </a:effectRef>
+          <a:fontRef idx="minor">
+            <a:schemeClr val="tx1"/>
+          </a:fontRef>
+        </p:style>
+      </p:cxnSp>
+      <p:cxnSp>
+        <p:nvCxnSpPr>
+          <p:cNvPr id="98" name="Straight Arrow Connector 97">
+            <a:extLst>
+              <a:ext uri="{FF2B5EF4-FFF2-40B4-BE49-F238E27FC236}">
+                <a16:creationId xmlns:a16="http://schemas.microsoft.com/office/drawing/2014/main" id="{6242AE07-0D30-CE42-BF2E-C68FEE547D5C}"/>
+              </a:ext>
+            </a:extLst>
+          </p:cNvPr>
+          <p:cNvCxnSpPr>
+            <a:cxnSpLocks/>
+            <a:stCxn id="59" idx="2"/>
+            <a:endCxn id="70" idx="6"/>
+          </p:cNvCxnSpPr>
+          <p:nvPr/>
+        </p:nvCxnSpPr>
+        <p:spPr>
+          <a:xfrm flipH="1" flipV="1">
+            <a:off x="8086155" y="2129116"/>
+            <a:ext cx="811305" cy="833719"/>
+          </a:xfrm>
+          <a:prstGeom prst="straightConnector1">
+            <a:avLst/>
+          </a:prstGeom>
+          <a:ln w="12700">
+            <a:solidFill>
+              <a:schemeClr val="tx1">
+                <a:lumMod val="50000"/>
+                <a:lumOff val="50000"/>
+              </a:schemeClr>
+            </a:solidFill>
+            <a:prstDash val="dash"/>
+            <a:headEnd type="none" w="med" len="med"/>
+            <a:tailEnd type="none" w="med" len="med"/>
+          </a:ln>
+        </p:spPr>
+        <p:style>
+          <a:lnRef idx="1">
+            <a:schemeClr val="dk1"/>
+          </a:lnRef>
+          <a:fillRef idx="0">
+            <a:schemeClr val="dk1"/>
+          </a:fillRef>
+          <a:effectRef idx="0">
+            <a:schemeClr val="dk1"/>
+          </a:effectRef>
+          <a:fontRef idx="minor">
+            <a:schemeClr val="tx1"/>
+          </a:fontRef>
+        </p:style>
+      </p:cxnSp>
+      <p:cxnSp>
+        <p:nvCxnSpPr>
+          <p:cNvPr id="101" name="Straight Arrow Connector 100">
+            <a:extLst>
+              <a:ext uri="{FF2B5EF4-FFF2-40B4-BE49-F238E27FC236}">
+                <a16:creationId xmlns:a16="http://schemas.microsoft.com/office/drawing/2014/main" id="{3C6945D0-8F85-E045-A884-E29C02E44557}"/>
+              </a:ext>
+            </a:extLst>
+          </p:cNvPr>
+          <p:cNvCxnSpPr>
+            <a:cxnSpLocks/>
+            <a:stCxn id="59" idx="2"/>
+            <a:endCxn id="68" idx="6"/>
+          </p:cNvCxnSpPr>
+          <p:nvPr/>
+        </p:nvCxnSpPr>
+        <p:spPr>
+          <a:xfrm flipH="1" flipV="1">
+            <a:off x="8086156" y="1295398"/>
+            <a:ext cx="811304" cy="1667437"/>
+          </a:xfrm>
+          <a:prstGeom prst="straightConnector1">
+            <a:avLst/>
+          </a:prstGeom>
+          <a:ln w="12700">
+            <a:solidFill>
+              <a:schemeClr val="tx1">
+                <a:lumMod val="50000"/>
+                <a:lumOff val="50000"/>
+              </a:schemeClr>
+            </a:solidFill>
+            <a:prstDash val="dash"/>
+            <a:headEnd type="none" w="med" len="med"/>
+            <a:tailEnd type="none" w="med" len="med"/>
+          </a:ln>
+        </p:spPr>
+        <p:style>
+          <a:lnRef idx="1">
+            <a:schemeClr val="dk1"/>
+          </a:lnRef>
+          <a:fillRef idx="0">
+            <a:schemeClr val="dk1"/>
+          </a:fillRef>
+          <a:effectRef idx="0">
+            <a:schemeClr val="dk1"/>
+          </a:effectRef>
+          <a:fontRef idx="minor">
+            <a:schemeClr val="tx1"/>
+          </a:fontRef>
+        </p:style>
+      </p:cxnSp>
+      <p:sp>
+        <p:nvSpPr>
+          <p:cNvPr id="104" name="Right Arrow 103">
+            <a:extLst>
+              <a:ext uri="{FF2B5EF4-FFF2-40B4-BE49-F238E27FC236}">
+                <a16:creationId xmlns:a16="http://schemas.microsoft.com/office/drawing/2014/main" id="{7FE43422-5EEB-1345-B417-27052B4BF0E6}"/>
+              </a:ext>
+            </a:extLst>
+          </p:cNvPr>
+          <p:cNvSpPr/>
+          <p:nvPr/>
+        </p:nvSpPr>
+        <p:spPr>
+          <a:xfrm>
+            <a:off x="5903827" y="2674842"/>
+            <a:ext cx="1052774" cy="575983"/>
+          </a:xfrm>
+          <a:prstGeom prst="rightArrow">
+            <a:avLst/>
+          </a:prstGeom>
+          <a:solidFill>
+            <a:schemeClr val="tx1">
+              <a:lumMod val="50000"/>
+              <a:lumOff val="50000"/>
+            </a:schemeClr>
+          </a:solidFill>
+          <a:ln>
+            <a:noFill/>
+          </a:ln>
+        </p:spPr>
+        <p:style>
+          <a:lnRef idx="2">
+            <a:schemeClr val="accent1">
+              <a:shade val="50000"/>
+            </a:schemeClr>
+          </a:lnRef>
+          <a:fillRef idx="1">
+            <a:schemeClr val="accent1"/>
+          </a:fillRef>
+          <a:effectRef idx="0">
+            <a:schemeClr val="accent1"/>
+          </a:effectRef>
+          <a:fontRef idx="minor">
+            <a:schemeClr val="lt1"/>
+          </a:fontRef>
+        </p:style>
+        <p:txBody>
+          <a:bodyPr rtlCol="0" anchor="ctr"/>
+          <a:lstStyle/>
+          <a:p>
+            <a:pPr algn="ctr"/>
+            <a:endParaRPr lang="en-US"/>
+          </a:p>
+        </p:txBody>
+      </p:sp>
+    </p:spTree>
+    <p:extLst>
+      <p:ext uri="{BB962C8B-B14F-4D97-AF65-F5344CB8AC3E}">
+        <p14:creationId xmlns:p14="http://schemas.microsoft.com/office/powerpoint/2010/main" val="1255327787"/>
       </p:ext>
     </p:extLst>
   </p:cSld>

</xml_diff>